<commit_message>
changes order of slides
</commit_message>
<xml_diff>
--- a/slides/AlgorithmAnalysisExamples.pptx
+++ b/slides/AlgorithmAnalysisExamples.pptx
@@ -6,11 +6,13 @@
   </p:sldMasterIdLst>
   <p:sldIdLst>
     <p:sldId id="256" r:id="rId2"/>
-    <p:sldId id="257" r:id="rId3"/>
-    <p:sldId id="258" r:id="rId4"/>
-    <p:sldId id="259" r:id="rId5"/>
-    <p:sldId id="260" r:id="rId6"/>
-    <p:sldId id="261" r:id="rId7"/>
+    <p:sldId id="262" r:id="rId3"/>
+    <p:sldId id="263" r:id="rId4"/>
+    <p:sldId id="260" r:id="rId5"/>
+    <p:sldId id="261" r:id="rId6"/>
+    <p:sldId id="257" r:id="rId7"/>
+    <p:sldId id="258" r:id="rId8"/>
+    <p:sldId id="259" r:id="rId9"/>
   </p:sldIdLst>
   <p:sldSz cx="12192000" cy="6858000"/>
   <p:notesSz cx="6858000" cy="9144000"/>
@@ -109,6 +111,11 @@
       </a:defRPr>
     </a:lvl9pPr>
   </p:defaultTextStyle>
+  <p:extLst>
+    <p:ext uri="{EFAFB233-063F-42B5-8137-9DF3F51BA10A}">
+      <p15:sldGuideLst xmlns:p15="http://schemas.microsoft.com/office/powerpoint/2012/main"/>
+    </p:ext>
+  </p:extLst>
 </p:presentation>
 </file>
 
@@ -263,7 +270,7 @@
           <a:p>
             <a:fld id="{1ECB5883-038C-4696-8E27-1811E470D6D4}" type="datetime1">
               <a:rPr lang="en-US" smtClean="0"/>
-              <a:t>2/8/24</a:t>
+              <a:t>2/9/24</a:t>
             </a:fld>
             <a:endParaRPr lang="en-US"/>
           </a:p>
@@ -464,7 +471,7 @@
           <a:p>
             <a:fld id="{61E8A6D4-154B-4E4D-9001-7A6C328D243E}" type="datetime1">
               <a:rPr lang="en-US" smtClean="0"/>
-              <a:t>2/8/24</a:t>
+              <a:t>2/9/24</a:t>
             </a:fld>
             <a:endParaRPr lang="en-US"/>
           </a:p>
@@ -675,7 +682,7 @@
           <a:p>
             <a:fld id="{EF880999-9BD6-4929-BDEC-B84E21C16701}" type="datetime1">
               <a:rPr lang="en-US" smtClean="0"/>
-              <a:t>2/8/24</a:t>
+              <a:t>2/9/24</a:t>
             </a:fld>
             <a:endParaRPr lang="en-US"/>
           </a:p>
@@ -876,7 +883,7 @@
           <a:p>
             <a:fld id="{579F6069-8263-4296-913A-BC2234E8D32B}" type="datetime1">
               <a:rPr lang="en-US" smtClean="0"/>
-              <a:t>2/8/24</a:t>
+              <a:t>2/9/24</a:t>
             </a:fld>
             <a:endParaRPr lang="en-US"/>
           </a:p>
@@ -1156,7 +1163,7 @@
           <a:p>
             <a:fld id="{BC9F5005-EC25-4FB9-B19B-2437F0B120D2}" type="datetime1">
               <a:rPr lang="en-US" smtClean="0"/>
-              <a:t>2/8/24</a:t>
+              <a:t>2/9/24</a:t>
             </a:fld>
             <a:endParaRPr lang="en-US"/>
           </a:p>
@@ -1424,7 +1431,7 @@
           <a:p>
             <a:fld id="{0B283B5C-2325-42FF-AF91-C1451D9D66CC}" type="datetime1">
               <a:rPr lang="en-US" smtClean="0"/>
-              <a:t>2/8/24</a:t>
+              <a:t>2/9/24</a:t>
             </a:fld>
             <a:endParaRPr lang="en-US"/>
           </a:p>
@@ -1843,7 +1850,7 @@
           <a:p>
             <a:fld id="{0F88DB08-3B01-46DD-99F2-F6F6334EA669}" type="datetime1">
               <a:rPr lang="en-US" smtClean="0"/>
-              <a:t>2/8/24</a:t>
+              <a:t>2/9/24</a:t>
             </a:fld>
             <a:endParaRPr lang="en-US"/>
           </a:p>
@@ -1987,7 +1994,7 @@
           <a:p>
             <a:fld id="{5892AC11-ACC3-4129-BBD7-C580BF1A4EE7}" type="datetime1">
               <a:rPr lang="en-US" smtClean="0"/>
-              <a:t>2/8/24</a:t>
+              <a:t>2/9/24</a:t>
             </a:fld>
             <a:endParaRPr lang="en-US"/>
           </a:p>
@@ -2103,7 +2110,7 @@
           <a:p>
             <a:fld id="{6D80F7F3-E406-44E2-93AF-674B3F1A2E51}" type="datetime1">
               <a:rPr lang="en-US" smtClean="0"/>
-              <a:t>2/8/24</a:t>
+              <a:t>2/9/24</a:t>
             </a:fld>
             <a:endParaRPr lang="en-US"/>
           </a:p>
@@ -2421,7 +2428,7 @@
           <a:p>
             <a:fld id="{2FB1DD93-7C9D-4E53-81F0-DDE57FEA7EDB}" type="datetime1">
               <a:rPr lang="en-US" smtClean="0"/>
-              <a:t>2/8/24</a:t>
+              <a:t>2/9/24</a:t>
             </a:fld>
             <a:endParaRPr lang="en-US"/>
           </a:p>
@@ -2714,7 +2721,7 @@
           <a:p>
             <a:fld id="{3DF7BC28-59DE-4F83-B4A1-497203279FAD}" type="datetime1">
               <a:rPr lang="en-US" smtClean="0"/>
-              <a:t>2/8/24</a:t>
+              <a:t>2/9/24</a:t>
             </a:fld>
             <a:endParaRPr lang="en-US"/>
           </a:p>
@@ -3014,7 +3021,7 @@
           <a:p>
             <a:fld id="{0BDC4764-F656-4735-9820-9886F8DF1D6A}" type="datetime1">
               <a:rPr lang="en-US" smtClean="0"/>
-              <a:t>2/8/24</a:t>
+              <a:t>2/9/24</a:t>
             </a:fld>
             <a:endParaRPr lang="en-US" dirty="0"/>
           </a:p>
@@ -4006,7 +4013,7 @@
           <p:cNvPr id="2" name="Title 1">
             <a:extLst>
               <a:ext uri="{FF2B5EF4-FFF2-40B4-BE49-F238E27FC236}">
-                <a16:creationId xmlns:a16="http://schemas.microsoft.com/office/drawing/2014/main" id="{5E16BE8B-5FA9-46F2-3B9E-99D38C45B3F8}"/>
+                <a16:creationId xmlns:a16="http://schemas.microsoft.com/office/drawing/2014/main" id="{F949A477-9579-8A63-E5F8-322D5B2855BB}"/>
               </a:ext>
             </a:extLst>
           </p:cNvPr>
@@ -4017,63 +4024,320 @@
             <p:ph type="title"/>
           </p:nvPr>
         </p:nvSpPr>
-        <p:spPr>
-          <a:xfrm>
-            <a:off x="871108" y="588245"/>
-            <a:ext cx="10449784" cy="1265928"/>
-          </a:xfrm>
-        </p:spPr>
-        <p:txBody>
-          <a:bodyPr anchor="b">
-            <a:normAutofit/>
-          </a:bodyPr>
-          <a:lstStyle/>
-          <a:p>
-            <a:r>
-              <a:rPr lang="en-US" dirty="0" err="1"/>
-              <a:t>OpCountExamples.replaceFirstX</a:t>
-            </a:r>
-            <a:endParaRPr lang="en-US" dirty="0"/>
-          </a:p>
-        </p:txBody>
-      </p:sp>
-      <p:pic>
-        <p:nvPicPr>
-          <p:cNvPr id="6" name="Picture 5">
-            <a:extLst>
-              <a:ext uri="{FF2B5EF4-FFF2-40B4-BE49-F238E27FC236}">
-                <a16:creationId xmlns:a16="http://schemas.microsoft.com/office/drawing/2014/main" id="{B9D131E5-B640-5756-0834-E5D302A280A0}"/>
-              </a:ext>
-            </a:extLst>
-          </p:cNvPr>
-          <p:cNvPicPr>
-            <a:picLocks noChangeAspect="1"/>
-          </p:cNvPicPr>
-          <p:nvPr/>
-        </p:nvPicPr>
-        <p:blipFill>
-          <a:blip r:embed="rId2"/>
-          <a:stretch>
-            <a:fillRect/>
-          </a:stretch>
-        </p:blipFill>
-        <p:spPr>
-          <a:xfrm>
-            <a:off x="1559722" y="2157984"/>
-            <a:ext cx="9078651" cy="3903819"/>
-          </a:xfrm>
-          <a:prstGeom prst="rect">
-            <a:avLst/>
-          </a:prstGeom>
-          <a:noFill/>
-        </p:spPr>
-      </p:pic>
-      <p:sp>
-        <p:nvSpPr>
-          <p:cNvPr id="3" name="Date Placeholder 2">
-            <a:extLst>
-              <a:ext uri="{FF2B5EF4-FFF2-40B4-BE49-F238E27FC236}">
-                <a16:creationId xmlns:a16="http://schemas.microsoft.com/office/drawing/2014/main" id="{A45E03F1-E569-AD34-030B-D4FCF30CC705}"/>
+        <p:spPr/>
+        <p:txBody>
+          <a:bodyPr/>
+          <a:lstStyle/>
+          <a:p>
+            <a:r>
+              <a:rPr lang="en-US" dirty="0"/>
+              <a:t>Prove or disprove this claim</a:t>
+            </a:r>
+          </a:p>
+        </p:txBody>
+      </p:sp>
+      <mc:AlternateContent xmlns:mc="http://schemas.openxmlformats.org/markup-compatibility/2006">
+        <mc:Choice xmlns:a14="http://schemas.microsoft.com/office/drawing/2010/main" Requires="a14">
+          <p:sp>
+            <p:nvSpPr>
+              <p:cNvPr id="3" name="Content Placeholder 2">
+                <a:extLst>
+                  <a:ext uri="{FF2B5EF4-FFF2-40B4-BE49-F238E27FC236}">
+                    <a16:creationId xmlns:a16="http://schemas.microsoft.com/office/drawing/2014/main" id="{1979EA69-2D0F-DFE1-A1ED-1F892CC4D4C3}"/>
+                  </a:ext>
+                </a:extLst>
+              </p:cNvPr>
+              <p:cNvSpPr>
+                <a:spLocks noGrp="1"/>
+              </p:cNvSpPr>
+              <p:nvPr>
+                <p:ph idx="1"/>
+              </p:nvPr>
+            </p:nvSpPr>
+            <p:spPr/>
+            <p:txBody>
+              <a:bodyPr/>
+              <a:lstStyle/>
+              <a:p>
+                <a:r>
+                  <a:rPr lang="en-US" dirty="0"/>
+                  <a:t>Suppose we have the function </a:t>
+                </a:r>
+                <a14:m>
+                  <m:oMath xmlns:m="http://schemas.openxmlformats.org/officeDocument/2006/math">
+                    <m:r>
+                      <a:rPr lang="en-US" b="0" i="1" smtClean="0">
+                        <a:latin typeface="Cambria Math" panose="02040503050406030204" pitchFamily="18" charset="0"/>
+                      </a:rPr>
+                      <m:t>𝑇</m:t>
+                    </m:r>
+                    <m:d>
+                      <m:dPr>
+                        <m:ctrlPr>
+                          <a:rPr lang="en-US" b="0" i="1" smtClean="0">
+                            <a:latin typeface="Cambria Math" panose="02040503050406030204" pitchFamily="18" charset="0"/>
+                          </a:rPr>
+                        </m:ctrlPr>
+                      </m:dPr>
+                      <m:e>
+                        <m:r>
+                          <a:rPr lang="en-US" b="0" i="1" smtClean="0">
+                            <a:latin typeface="Cambria Math" panose="02040503050406030204" pitchFamily="18" charset="0"/>
+                          </a:rPr>
+                          <m:t>𝑛</m:t>
+                        </m:r>
+                      </m:e>
+                    </m:d>
+                    <m:r>
+                      <a:rPr lang="en-US" b="0" i="1" smtClean="0">
+                        <a:latin typeface="Cambria Math" panose="02040503050406030204" pitchFamily="18" charset="0"/>
+                      </a:rPr>
+                      <m:t>=2</m:t>
+                    </m:r>
+                    <m:sSup>
+                      <m:sSupPr>
+                        <m:ctrlPr>
+                          <a:rPr lang="en-US" b="0" i="1" smtClean="0">
+                            <a:latin typeface="Cambria Math" panose="02040503050406030204" pitchFamily="18" charset="0"/>
+                          </a:rPr>
+                        </m:ctrlPr>
+                      </m:sSupPr>
+                      <m:e>
+                        <m:r>
+                          <a:rPr lang="en-US" b="0" i="1" smtClean="0">
+                            <a:latin typeface="Cambria Math" panose="02040503050406030204" pitchFamily="18" charset="0"/>
+                          </a:rPr>
+                          <m:t>𝑛</m:t>
+                        </m:r>
+                      </m:e>
+                      <m:sup>
+                        <m:r>
+                          <a:rPr lang="en-US" b="0" i="1" smtClean="0">
+                            <a:latin typeface="Cambria Math" panose="02040503050406030204" pitchFamily="18" charset="0"/>
+                          </a:rPr>
+                          <m:t>2</m:t>
+                        </m:r>
+                      </m:sup>
+                    </m:sSup>
+                    <m:r>
+                      <a:rPr lang="en-US" b="0" i="1" smtClean="0">
+                        <a:latin typeface="Cambria Math" panose="02040503050406030204" pitchFamily="18" charset="0"/>
+                      </a:rPr>
+                      <m:t>+5</m:t>
+                    </m:r>
+                    <m:r>
+                      <a:rPr lang="en-US" b="0" i="1" smtClean="0">
+                        <a:latin typeface="Cambria Math" panose="02040503050406030204" pitchFamily="18" charset="0"/>
+                      </a:rPr>
+                      <m:t>𝑛</m:t>
+                    </m:r>
+                    <m:r>
+                      <a:rPr lang="en-US" b="0" i="1" smtClean="0">
+                        <a:latin typeface="Cambria Math" panose="02040503050406030204" pitchFamily="18" charset="0"/>
+                      </a:rPr>
+                      <m:t>+8</m:t>
+                    </m:r>
+                  </m:oMath>
+                </a14:m>
+                <a:r>
+                  <a:rPr lang="en-US" dirty="0"/>
+                  <a:t> </a:t>
+                </a:r>
+              </a:p>
+              <a:p>
+                <a:r>
+                  <a:rPr lang="en-US" dirty="0"/>
+                  <a:t>Is </a:t>
+                </a:r>
+                <a14:m>
+                  <m:oMath xmlns:m="http://schemas.openxmlformats.org/officeDocument/2006/math">
+                    <m:r>
+                      <a:rPr lang="en-US" b="0" i="1" smtClean="0">
+                        <a:latin typeface="Cambria Math" panose="02040503050406030204" pitchFamily="18" charset="0"/>
+                      </a:rPr>
+                      <m:t>𝑇</m:t>
+                    </m:r>
+                    <m:r>
+                      <a:rPr lang="en-US" b="0" i="1" smtClean="0">
+                        <a:latin typeface="Cambria Math" panose="02040503050406030204" pitchFamily="18" charset="0"/>
+                      </a:rPr>
+                      <m:t>(</m:t>
+                    </m:r>
+                    <m:r>
+                      <a:rPr lang="en-US" b="0" i="1" smtClean="0">
+                        <a:latin typeface="Cambria Math" panose="02040503050406030204" pitchFamily="18" charset="0"/>
+                      </a:rPr>
+                      <m:t>𝑛</m:t>
+                    </m:r>
+                    <m:r>
+                      <a:rPr lang="en-US" b="0" i="1" smtClean="0">
+                        <a:latin typeface="Cambria Math" panose="02040503050406030204" pitchFamily="18" charset="0"/>
+                      </a:rPr>
+                      <m:t>)</m:t>
+                    </m:r>
+                  </m:oMath>
+                </a14:m>
+                <a:r>
+                  <a:rPr lang="en-US" dirty="0"/>
+                  <a:t> in </a:t>
+                </a:r>
+                <a14:m>
+                  <m:oMath xmlns:m="http://schemas.openxmlformats.org/officeDocument/2006/math">
+                    <m:r>
+                      <a:rPr lang="en-US" b="0" i="1" smtClean="0">
+                        <a:latin typeface="Cambria Math" panose="02040503050406030204" pitchFamily="18" charset="0"/>
+                      </a:rPr>
+                      <m:t>𝑂</m:t>
+                    </m:r>
+                    <m:r>
+                      <a:rPr lang="en-US" b="0" i="1" smtClean="0">
+                        <a:latin typeface="Cambria Math" panose="02040503050406030204" pitchFamily="18" charset="0"/>
+                      </a:rPr>
+                      <m:t>(</m:t>
+                    </m:r>
+                    <m:r>
+                      <a:rPr lang="en-US" b="0" i="1" smtClean="0">
+                        <a:latin typeface="Cambria Math" panose="02040503050406030204" pitchFamily="18" charset="0"/>
+                      </a:rPr>
+                      <m:t>𝑛</m:t>
+                    </m:r>
+                    <m:r>
+                      <a:rPr lang="en-US" b="0" i="1" smtClean="0">
+                        <a:latin typeface="Cambria Math" panose="02040503050406030204" pitchFamily="18" charset="0"/>
+                      </a:rPr>
+                      <m:t>)</m:t>
+                    </m:r>
+                  </m:oMath>
+                </a14:m>
+                <a:r>
+                  <a:rPr lang="en-US" dirty="0"/>
+                  <a:t>?</a:t>
+                </a:r>
+              </a:p>
+              <a:p>
+                <a:pPr lvl="1"/>
+                <a:r>
+                  <a:rPr lang="en-US" dirty="0"/>
+                  <a:t>Can we find a constant </a:t>
+                </a:r>
+                <a14:m>
+                  <m:oMath xmlns:m="http://schemas.openxmlformats.org/officeDocument/2006/math">
+                    <m:r>
+                      <a:rPr lang="en-US" b="0" i="1" smtClean="0">
+                        <a:latin typeface="Cambria Math" panose="02040503050406030204" pitchFamily="18" charset="0"/>
+                      </a:rPr>
+                      <m:t>𝑐</m:t>
+                    </m:r>
+                  </m:oMath>
+                </a14:m>
+                <a:r>
+                  <a:rPr lang="en-US" dirty="0"/>
+                  <a:t> and </a:t>
+                </a:r>
+                <a14:m>
+                  <m:oMath xmlns:m="http://schemas.openxmlformats.org/officeDocument/2006/math">
+                    <m:sSub>
+                      <m:sSubPr>
+                        <m:ctrlPr>
+                          <a:rPr lang="en-US" i="1" smtClean="0">
+                            <a:latin typeface="Cambria Math" panose="02040503050406030204" pitchFamily="18" charset="0"/>
+                          </a:rPr>
+                        </m:ctrlPr>
+                      </m:sSubPr>
+                      <m:e>
+                        <m:r>
+                          <a:rPr lang="en-US" b="0" i="1" smtClean="0">
+                            <a:latin typeface="Cambria Math" panose="02040503050406030204" pitchFamily="18" charset="0"/>
+                          </a:rPr>
+                          <m:t>𝑛</m:t>
+                        </m:r>
+                      </m:e>
+                      <m:sub>
+                        <m:r>
+                          <a:rPr lang="en-US" b="0" i="1" smtClean="0">
+                            <a:latin typeface="Cambria Math" panose="02040503050406030204" pitchFamily="18" charset="0"/>
+                          </a:rPr>
+                          <m:t>0</m:t>
+                        </m:r>
+                      </m:sub>
+                    </m:sSub>
+                  </m:oMath>
+                </a14:m>
+                <a:r>
+                  <a:rPr lang="en-US" dirty="0"/>
+                  <a:t> that would create a linear upper bound?</a:t>
+                </a:r>
+              </a:p>
+              <a:p>
+                <a:pPr lvl="1"/>
+                <a:r>
+                  <a:rPr lang="en-US" dirty="0"/>
+                  <a:t>What if I pick a really large </a:t>
+                </a:r>
+                <a14:m>
+                  <m:oMath xmlns:m="http://schemas.openxmlformats.org/officeDocument/2006/math">
+                    <m:r>
+                      <a:rPr lang="en-US" b="0" i="1" smtClean="0">
+                        <a:latin typeface="Cambria Math" panose="02040503050406030204" pitchFamily="18" charset="0"/>
+                      </a:rPr>
+                      <m:t>𝑐</m:t>
+                    </m:r>
+                  </m:oMath>
+                </a14:m>
+                <a:r>
+                  <a:rPr lang="en-US" dirty="0"/>
+                  <a:t> value? </a:t>
+                </a:r>
+              </a:p>
+            </p:txBody>
+          </p:sp>
+        </mc:Choice>
+        <mc:Fallback>
+          <p:sp>
+            <p:nvSpPr>
+              <p:cNvPr id="3" name="Content Placeholder 2">
+                <a:extLst>
+                  <a:ext uri="{FF2B5EF4-FFF2-40B4-BE49-F238E27FC236}">
+                    <a16:creationId xmlns:a16="http://schemas.microsoft.com/office/drawing/2014/main" id="{1979EA69-2D0F-DFE1-A1ED-1F892CC4D4C3}"/>
+                  </a:ext>
+                </a:extLst>
+              </p:cNvPr>
+              <p:cNvSpPr>
+                <a:spLocks noGrp="1" noRot="1" noChangeAspect="1" noMove="1" noResize="1" noEditPoints="1" noAdjustHandles="1" noChangeArrowheads="1" noChangeShapeType="1" noTextEdit="1"/>
+              </p:cNvSpPr>
+              <p:nvPr>
+                <p:ph idx="1"/>
+              </p:nvPr>
+            </p:nvSpPr>
+            <p:spPr>
+              <a:blipFill>
+                <a:blip r:embed="rId2"/>
+                <a:stretch>
+                  <a:fillRect l="-243"/>
+                </a:stretch>
+              </a:blipFill>
+            </p:spPr>
+            <p:txBody>
+              <a:bodyPr/>
+              <a:lstStyle/>
+              <a:p>
+                <a:r>
+                  <a:rPr lang="en-US">
+                    <a:noFill/>
+                  </a:rPr>
+                  <a:t> </a:t>
+                </a:r>
+              </a:p>
+            </p:txBody>
+          </p:sp>
+        </mc:Fallback>
+      </mc:AlternateContent>
+      <p:sp>
+        <p:nvSpPr>
+          <p:cNvPr id="4" name="Date Placeholder 3">
+            <a:extLst>
+              <a:ext uri="{FF2B5EF4-FFF2-40B4-BE49-F238E27FC236}">
+                <a16:creationId xmlns:a16="http://schemas.microsoft.com/office/drawing/2014/main" id="{9CB66293-DC87-04A9-3BDD-6514BF33167A}"/>
               </a:ext>
             </a:extLst>
           </p:cNvPr>
@@ -4084,31 +4348,14 @@
             <p:ph type="dt" sz="half" idx="10"/>
           </p:nvPr>
         </p:nvSpPr>
-        <p:spPr>
-          <a:xfrm>
-            <a:off x="877824" y="6356350"/>
-            <a:ext cx="2743200" cy="365125"/>
-          </a:xfrm>
-        </p:spPr>
-        <p:txBody>
-          <a:bodyPr anchor="ctr">
-            <a:normAutofit/>
-          </a:bodyPr>
-          <a:lstStyle/>
-          <a:p>
-            <a:pPr>
-              <a:spcAft>
-                <a:spcPts val="600"/>
-              </a:spcAft>
-            </a:pPr>
-            <a:fld id="{5892AC11-ACC3-4129-BBD7-C580BF1A4EE7}" type="datetime1">
+        <p:spPr/>
+        <p:txBody>
+          <a:bodyPr/>
+          <a:lstStyle/>
+          <a:p>
+            <a:fld id="{579F6069-8263-4296-913A-BC2234E8D32B}" type="datetime1">
               <a:rPr lang="en-US" smtClean="0"/>
-              <a:pPr>
-                <a:spcAft>
-                  <a:spcPts val="600"/>
-                </a:spcAft>
-              </a:pPr>
-              <a:t>2/8/24</a:t>
+              <a:t>2/9/24</a:t>
             </a:fld>
             <a:endParaRPr lang="en-US"/>
           </a:p>
@@ -4116,10 +4363,10 @@
       </p:sp>
       <p:sp>
         <p:nvSpPr>
-          <p:cNvPr id="4" name="Footer Placeholder 3">
-            <a:extLst>
-              <a:ext uri="{FF2B5EF4-FFF2-40B4-BE49-F238E27FC236}">
-                <a16:creationId xmlns:a16="http://schemas.microsoft.com/office/drawing/2014/main" id="{C1A25634-6A83-80FF-2AC6-41206D12693C}"/>
+          <p:cNvPr id="5" name="Footer Placeholder 4">
+            <a:extLst>
+              <a:ext uri="{FF2B5EF4-FFF2-40B4-BE49-F238E27FC236}">
+                <a16:creationId xmlns:a16="http://schemas.microsoft.com/office/drawing/2014/main" id="{594AE3AD-D5C6-DCAD-4620-C1153C67F437}"/>
               </a:ext>
             </a:extLst>
           </p:cNvPr>
@@ -4130,23 +4377,11 @@
             <p:ph type="ftr" sz="quarter" idx="11"/>
           </p:nvPr>
         </p:nvSpPr>
-        <p:spPr>
-          <a:xfrm>
-            <a:off x="7132320" y="6356350"/>
-            <a:ext cx="4297680" cy="365125"/>
-          </a:xfrm>
-        </p:spPr>
-        <p:txBody>
-          <a:bodyPr anchor="ctr">
-            <a:normAutofit/>
-          </a:bodyPr>
-          <a:lstStyle/>
-          <a:p>
-            <a:pPr>
-              <a:spcAft>
-                <a:spcPts val="600"/>
-              </a:spcAft>
-            </a:pPr>
+        <p:spPr/>
+        <p:txBody>
+          <a:bodyPr/>
+          <a:lstStyle/>
+          <a:p>
             <a:r>
               <a:rPr lang="en-US"/>
               <a:t>Sample Footer Text</a:t>
@@ -4156,10 +4391,10 @@
       </p:sp>
       <p:sp>
         <p:nvSpPr>
-          <p:cNvPr id="5" name="Slide Number Placeholder 4">
-            <a:extLst>
-              <a:ext uri="{FF2B5EF4-FFF2-40B4-BE49-F238E27FC236}">
-                <a16:creationId xmlns:a16="http://schemas.microsoft.com/office/drawing/2014/main" id="{C69D2AD7-265F-5E42-4480-B773B7A07BD0}"/>
+          <p:cNvPr id="6" name="Slide Number Placeholder 5">
+            <a:extLst>
+              <a:ext uri="{FF2B5EF4-FFF2-40B4-BE49-F238E27FC236}">
+                <a16:creationId xmlns:a16="http://schemas.microsoft.com/office/drawing/2014/main" id="{94A64618-A61A-62CB-2724-606212B1FF78}"/>
               </a:ext>
             </a:extLst>
           </p:cNvPr>
@@ -4170,30 +4405,13 @@
             <p:ph type="sldNum" sz="quarter" idx="12"/>
           </p:nvPr>
         </p:nvSpPr>
-        <p:spPr>
-          <a:xfrm>
-            <a:off x="11429999" y="6356350"/>
-            <a:ext cx="521207" cy="365125"/>
-          </a:xfrm>
-        </p:spPr>
-        <p:txBody>
-          <a:bodyPr anchor="ctr">
-            <a:normAutofit/>
-          </a:bodyPr>
-          <a:lstStyle/>
-          <a:p>
-            <a:pPr>
-              <a:spcAft>
-                <a:spcPts val="600"/>
-              </a:spcAft>
-            </a:pPr>
+        <p:spPr/>
+        <p:txBody>
+          <a:bodyPr/>
+          <a:lstStyle/>
+          <a:p>
             <a:fld id="{C68AC1EC-23E2-4F0E-A5A4-674EC8DB954E}" type="slidenum">
               <a:rPr lang="en-US" smtClean="0"/>
-              <a:pPr>
-                <a:spcAft>
-                  <a:spcPts val="600"/>
-                </a:spcAft>
-              </a:pPr>
               <a:t>2</a:t>
             </a:fld>
             <a:endParaRPr lang="en-US"/>
@@ -4203,7 +4421,7 @@
     </p:spTree>
     <p:extLst>
       <p:ext uri="{BB962C8B-B14F-4D97-AF65-F5344CB8AC3E}">
-        <p14:creationId xmlns:p14="http://schemas.microsoft.com/office/powerpoint/2010/main" val="13563772"/>
+        <p14:creationId xmlns:p14="http://schemas.microsoft.com/office/powerpoint/2010/main" val="1524116056"/>
       </p:ext>
     </p:extLst>
   </p:cSld>
@@ -4218,7 +4436,13 @@
   <p:cSld>
     <p:spTree>
       <p:nvGrpSpPr>
-        <p:cNvPr id="1" name=""/>
+        <p:cNvPr id="1" name="">
+          <a:extLst>
+            <a:ext uri="{FF2B5EF4-FFF2-40B4-BE49-F238E27FC236}">
+              <a16:creationId xmlns:a16="http://schemas.microsoft.com/office/drawing/2014/main" id="{F6908250-2FEC-5404-8AC5-DE19E06D6E07}"/>
+            </a:ext>
+          </a:extLst>
+        </p:cNvPr>
         <p:cNvGrpSpPr/>
         <p:nvPr/>
       </p:nvGrpSpPr>
@@ -4235,7 +4459,7 @@
           <p:cNvPr id="2" name="Title 1">
             <a:extLst>
               <a:ext uri="{FF2B5EF4-FFF2-40B4-BE49-F238E27FC236}">
-                <a16:creationId xmlns:a16="http://schemas.microsoft.com/office/drawing/2014/main" id="{A8EF3A35-9AAE-221F-D22C-DF5CF26714AD}"/>
+                <a16:creationId xmlns:a16="http://schemas.microsoft.com/office/drawing/2014/main" id="{5ECD66F6-4EA4-27F3-A78D-A3FFB4D466CC}"/>
               </a:ext>
             </a:extLst>
           </p:cNvPr>
@@ -4246,63 +4470,466 @@
             <p:ph type="title"/>
           </p:nvPr>
         </p:nvSpPr>
-        <p:spPr>
-          <a:xfrm>
-            <a:off x="871108" y="588245"/>
-            <a:ext cx="10449784" cy="1265928"/>
-          </a:xfrm>
-        </p:spPr>
-        <p:txBody>
-          <a:bodyPr anchor="b">
-            <a:normAutofit/>
-          </a:bodyPr>
-          <a:lstStyle/>
-          <a:p>
-            <a:r>
-              <a:rPr lang="en-US" dirty="0" err="1"/>
-              <a:t>OpCountExample.mostFrequentValue</a:t>
-            </a:r>
-            <a:endParaRPr lang="en-US" dirty="0"/>
-          </a:p>
-        </p:txBody>
-      </p:sp>
-      <p:pic>
-        <p:nvPicPr>
-          <p:cNvPr id="7" name="Picture 6">
-            <a:extLst>
-              <a:ext uri="{FF2B5EF4-FFF2-40B4-BE49-F238E27FC236}">
-                <a16:creationId xmlns:a16="http://schemas.microsoft.com/office/drawing/2014/main" id="{7456D16A-6992-482A-D396-0C29748A579C}"/>
-              </a:ext>
-            </a:extLst>
-          </p:cNvPr>
-          <p:cNvPicPr>
-            <a:picLocks noChangeAspect="1"/>
-          </p:cNvPicPr>
-          <p:nvPr/>
-        </p:nvPicPr>
-        <p:blipFill>
-          <a:blip r:embed="rId2"/>
-          <a:stretch>
-            <a:fillRect/>
-          </a:stretch>
-        </p:blipFill>
-        <p:spPr>
-          <a:xfrm>
-            <a:off x="2899197" y="2157984"/>
-            <a:ext cx="6399702" cy="3903819"/>
-          </a:xfrm>
-          <a:prstGeom prst="rect">
-            <a:avLst/>
-          </a:prstGeom>
-          <a:noFill/>
-        </p:spPr>
-      </p:pic>
+        <p:spPr/>
+        <p:txBody>
+          <a:bodyPr/>
+          <a:lstStyle/>
+          <a:p>
+            <a:r>
+              <a:rPr lang="en-US" dirty="0"/>
+              <a:t>Prove or disprove this claim</a:t>
+            </a:r>
+          </a:p>
+        </p:txBody>
+      </p:sp>
+      <mc:AlternateContent xmlns:mc="http://schemas.openxmlformats.org/markup-compatibility/2006">
+        <mc:Choice xmlns:a14="http://schemas.microsoft.com/office/drawing/2010/main" Requires="a14">
+          <p:sp>
+            <p:nvSpPr>
+              <p:cNvPr id="3" name="Content Placeholder 2">
+                <a:extLst>
+                  <a:ext uri="{FF2B5EF4-FFF2-40B4-BE49-F238E27FC236}">
+                    <a16:creationId xmlns:a16="http://schemas.microsoft.com/office/drawing/2014/main" id="{3C5AFB61-F6AB-B0A0-DED1-D443C59FA180}"/>
+                  </a:ext>
+                </a:extLst>
+              </p:cNvPr>
+              <p:cNvSpPr>
+                <a:spLocks noGrp="1"/>
+              </p:cNvSpPr>
+              <p:nvPr>
+                <p:ph idx="1"/>
+              </p:nvPr>
+            </p:nvSpPr>
+            <p:spPr/>
+            <p:txBody>
+              <a:bodyPr/>
+              <a:lstStyle/>
+              <a:p>
+                <a:r>
+                  <a:rPr lang="en-US" dirty="0"/>
+                  <a:t>Suppose we have the function </a:t>
+                </a:r>
+                <a14:m>
+                  <m:oMath xmlns:m="http://schemas.openxmlformats.org/officeDocument/2006/math">
+                    <m:r>
+                      <a:rPr lang="en-US" b="0" i="1" smtClean="0">
+                        <a:latin typeface="Cambria Math" panose="02040503050406030204" pitchFamily="18" charset="0"/>
+                      </a:rPr>
+                      <m:t>𝑇</m:t>
+                    </m:r>
+                    <m:d>
+                      <m:dPr>
+                        <m:ctrlPr>
+                          <a:rPr lang="en-US" b="0" i="1" smtClean="0">
+                            <a:latin typeface="Cambria Math" panose="02040503050406030204" pitchFamily="18" charset="0"/>
+                          </a:rPr>
+                        </m:ctrlPr>
+                      </m:dPr>
+                      <m:e>
+                        <m:r>
+                          <a:rPr lang="en-US" b="0" i="1" smtClean="0">
+                            <a:latin typeface="Cambria Math" panose="02040503050406030204" pitchFamily="18" charset="0"/>
+                          </a:rPr>
+                          <m:t>𝑛</m:t>
+                        </m:r>
+                      </m:e>
+                    </m:d>
+                    <m:r>
+                      <a:rPr lang="en-US" b="0" i="1" smtClean="0">
+                        <a:latin typeface="Cambria Math" panose="02040503050406030204" pitchFamily="18" charset="0"/>
+                      </a:rPr>
+                      <m:t>=2</m:t>
+                    </m:r>
+                    <m:sSup>
+                      <m:sSupPr>
+                        <m:ctrlPr>
+                          <a:rPr lang="en-US" b="0" i="1" smtClean="0">
+                            <a:latin typeface="Cambria Math" panose="02040503050406030204" pitchFamily="18" charset="0"/>
+                          </a:rPr>
+                        </m:ctrlPr>
+                      </m:sSupPr>
+                      <m:e>
+                        <m:r>
+                          <a:rPr lang="en-US" b="0" i="1" smtClean="0">
+                            <a:latin typeface="Cambria Math" panose="02040503050406030204" pitchFamily="18" charset="0"/>
+                          </a:rPr>
+                          <m:t>𝑛</m:t>
+                        </m:r>
+                      </m:e>
+                      <m:sup>
+                        <m:r>
+                          <a:rPr lang="en-US" b="0" i="1" smtClean="0">
+                            <a:latin typeface="Cambria Math" panose="02040503050406030204" pitchFamily="18" charset="0"/>
+                          </a:rPr>
+                          <m:t>2</m:t>
+                        </m:r>
+                      </m:sup>
+                    </m:sSup>
+                    <m:r>
+                      <a:rPr lang="en-US" b="0" i="1" smtClean="0">
+                        <a:latin typeface="Cambria Math" panose="02040503050406030204" pitchFamily="18" charset="0"/>
+                      </a:rPr>
+                      <m:t>+5</m:t>
+                    </m:r>
+                    <m:r>
+                      <a:rPr lang="en-US" b="0" i="1" smtClean="0">
+                        <a:latin typeface="Cambria Math" panose="02040503050406030204" pitchFamily="18" charset="0"/>
+                      </a:rPr>
+                      <m:t>𝑛</m:t>
+                    </m:r>
+                    <m:r>
+                      <a:rPr lang="en-US" b="0" i="1" smtClean="0">
+                        <a:latin typeface="Cambria Math" panose="02040503050406030204" pitchFamily="18" charset="0"/>
+                      </a:rPr>
+                      <m:t>+8</m:t>
+                    </m:r>
+                  </m:oMath>
+                </a14:m>
+                <a:r>
+                  <a:rPr lang="en-US" dirty="0"/>
+                  <a:t> </a:t>
+                </a:r>
+              </a:p>
+              <a:p>
+                <a:r>
+                  <a:rPr lang="en-US" dirty="0"/>
+                  <a:t>Is </a:t>
+                </a:r>
+                <a14:m>
+                  <m:oMath xmlns:m="http://schemas.openxmlformats.org/officeDocument/2006/math">
+                    <m:r>
+                      <a:rPr lang="en-US" b="0" i="1" smtClean="0">
+                        <a:latin typeface="Cambria Math" panose="02040503050406030204" pitchFamily="18" charset="0"/>
+                      </a:rPr>
+                      <m:t>𝑇</m:t>
+                    </m:r>
+                    <m:r>
+                      <a:rPr lang="en-US" b="0" i="1" smtClean="0">
+                        <a:latin typeface="Cambria Math" panose="02040503050406030204" pitchFamily="18" charset="0"/>
+                      </a:rPr>
+                      <m:t>(</m:t>
+                    </m:r>
+                    <m:r>
+                      <a:rPr lang="en-US" b="0" i="1" smtClean="0">
+                        <a:latin typeface="Cambria Math" panose="02040503050406030204" pitchFamily="18" charset="0"/>
+                      </a:rPr>
+                      <m:t>𝑛</m:t>
+                    </m:r>
+                    <m:r>
+                      <a:rPr lang="en-US" b="0" i="1" smtClean="0">
+                        <a:latin typeface="Cambria Math" panose="02040503050406030204" pitchFamily="18" charset="0"/>
+                      </a:rPr>
+                      <m:t>)</m:t>
+                    </m:r>
+                  </m:oMath>
+                </a14:m>
+                <a:r>
+                  <a:rPr lang="en-US" dirty="0"/>
+                  <a:t> in </a:t>
+                </a:r>
+                <a14:m>
+                  <m:oMath xmlns:m="http://schemas.openxmlformats.org/officeDocument/2006/math">
+                    <m:r>
+                      <a:rPr lang="en-US" b="0" i="1" smtClean="0">
+                        <a:latin typeface="Cambria Math" panose="02040503050406030204" pitchFamily="18" charset="0"/>
+                      </a:rPr>
+                      <m:t>𝑂</m:t>
+                    </m:r>
+                    <m:r>
+                      <a:rPr lang="en-US" b="0" i="1" smtClean="0">
+                        <a:latin typeface="Cambria Math" panose="02040503050406030204" pitchFamily="18" charset="0"/>
+                      </a:rPr>
+                      <m:t>(</m:t>
+                    </m:r>
+                    <m:r>
+                      <a:rPr lang="en-US" b="0" i="1" smtClean="0">
+                        <a:latin typeface="Cambria Math" panose="02040503050406030204" pitchFamily="18" charset="0"/>
+                      </a:rPr>
+                      <m:t>𝑛</m:t>
+                    </m:r>
+                    <m:r>
+                      <a:rPr lang="en-US" b="0" i="1" smtClean="0">
+                        <a:latin typeface="Cambria Math" panose="02040503050406030204" pitchFamily="18" charset="0"/>
+                      </a:rPr>
+                      <m:t>)</m:t>
+                    </m:r>
+                  </m:oMath>
+                </a14:m>
+                <a:r>
+                  <a:rPr lang="en-US" dirty="0"/>
+                  <a:t>?</a:t>
+                </a:r>
+              </a:p>
+              <a:p>
+                <a:pPr lvl="1"/>
+                <a:r>
+                  <a:rPr lang="en-US" dirty="0"/>
+                  <a:t>Can we find a constant </a:t>
+                </a:r>
+                <a14:m>
+                  <m:oMath xmlns:m="http://schemas.openxmlformats.org/officeDocument/2006/math">
+                    <m:r>
+                      <a:rPr lang="en-US" b="0" i="1" smtClean="0">
+                        <a:latin typeface="Cambria Math" panose="02040503050406030204" pitchFamily="18" charset="0"/>
+                      </a:rPr>
+                      <m:t>𝑐</m:t>
+                    </m:r>
+                  </m:oMath>
+                </a14:m>
+                <a:r>
+                  <a:rPr lang="en-US" dirty="0"/>
+                  <a:t> and </a:t>
+                </a:r>
+                <a14:m>
+                  <m:oMath xmlns:m="http://schemas.openxmlformats.org/officeDocument/2006/math">
+                    <m:sSub>
+                      <m:sSubPr>
+                        <m:ctrlPr>
+                          <a:rPr lang="en-US" i="1" smtClean="0">
+                            <a:latin typeface="Cambria Math" panose="02040503050406030204" pitchFamily="18" charset="0"/>
+                          </a:rPr>
+                        </m:ctrlPr>
+                      </m:sSubPr>
+                      <m:e>
+                        <m:r>
+                          <a:rPr lang="en-US" b="0" i="1" smtClean="0">
+                            <a:latin typeface="Cambria Math" panose="02040503050406030204" pitchFamily="18" charset="0"/>
+                          </a:rPr>
+                          <m:t>𝑛</m:t>
+                        </m:r>
+                      </m:e>
+                      <m:sub>
+                        <m:r>
+                          <a:rPr lang="en-US" b="0" i="1" smtClean="0">
+                            <a:latin typeface="Cambria Math" panose="02040503050406030204" pitchFamily="18" charset="0"/>
+                          </a:rPr>
+                          <m:t>0</m:t>
+                        </m:r>
+                      </m:sub>
+                    </m:sSub>
+                  </m:oMath>
+                </a14:m>
+                <a:r>
+                  <a:rPr lang="en-US" dirty="0"/>
+                  <a:t> that would create a linear upper bound?</a:t>
+                </a:r>
+              </a:p>
+              <a:p>
+                <a:pPr lvl="1"/>
+                <a:r>
+                  <a:rPr lang="en-US" dirty="0"/>
+                  <a:t>What if I pick a really large </a:t>
+                </a:r>
+                <a14:m>
+                  <m:oMath xmlns:m="http://schemas.openxmlformats.org/officeDocument/2006/math">
+                    <m:r>
+                      <a:rPr lang="en-US" b="0" i="1" smtClean="0">
+                        <a:latin typeface="Cambria Math" panose="02040503050406030204" pitchFamily="18" charset="0"/>
+                      </a:rPr>
+                      <m:t>𝑐</m:t>
+                    </m:r>
+                  </m:oMath>
+                </a14:m>
+                <a:r>
+                  <a:rPr lang="en-US" dirty="0"/>
+                  <a:t> value? </a:t>
+                </a:r>
+              </a:p>
+              <a:p>
+                <a:r>
+                  <a:rPr lang="en-US" dirty="0"/>
+                  <a:t>Can we claim </a:t>
+                </a:r>
+                <a14:m>
+                  <m:oMath xmlns:m="http://schemas.openxmlformats.org/officeDocument/2006/math">
+                    <m:r>
+                      <a:rPr lang="en-US" b="0" i="1" smtClean="0">
+                        <a:latin typeface="Cambria Math" panose="02040503050406030204" pitchFamily="18" charset="0"/>
+                      </a:rPr>
+                      <m:t>𝑇</m:t>
+                    </m:r>
+                    <m:r>
+                      <a:rPr lang="en-US" b="0" i="1" smtClean="0">
+                        <a:latin typeface="Cambria Math" panose="02040503050406030204" pitchFamily="18" charset="0"/>
+                      </a:rPr>
+                      <m:t>(</m:t>
+                    </m:r>
+                    <m:r>
+                      <a:rPr lang="en-US" b="0" i="1" smtClean="0">
+                        <a:latin typeface="Cambria Math" panose="02040503050406030204" pitchFamily="18" charset="0"/>
+                      </a:rPr>
+                      <m:t>𝑛</m:t>
+                    </m:r>
+                    <m:r>
+                      <a:rPr lang="en-US" b="0" i="1" smtClean="0">
+                        <a:latin typeface="Cambria Math" panose="02040503050406030204" pitchFamily="18" charset="0"/>
+                      </a:rPr>
+                      <m:t>)</m:t>
+                    </m:r>
+                  </m:oMath>
+                </a14:m>
+                <a:r>
+                  <a:rPr lang="en-US" dirty="0"/>
+                  <a:t> is in </a:t>
+                </a:r>
+                <a14:m>
+                  <m:oMath xmlns:m="http://schemas.openxmlformats.org/officeDocument/2006/math">
+                    <m:sSup>
+                      <m:sSupPr>
+                        <m:ctrlPr>
+                          <a:rPr lang="en-US" i="1" smtClean="0">
+                            <a:latin typeface="Cambria Math" panose="02040503050406030204" pitchFamily="18" charset="0"/>
+                          </a:rPr>
+                        </m:ctrlPr>
+                      </m:sSupPr>
+                      <m:e>
+                        <m:r>
+                          <a:rPr lang="en-US" b="0" i="1" smtClean="0">
+                            <a:latin typeface="Cambria Math" panose="02040503050406030204" pitchFamily="18" charset="0"/>
+                          </a:rPr>
+                          <m:t>𝑂</m:t>
+                        </m:r>
+                        <m:r>
+                          <a:rPr lang="en-US" b="0" i="1" smtClean="0">
+                            <a:latin typeface="Cambria Math" panose="02040503050406030204" pitchFamily="18" charset="0"/>
+                          </a:rPr>
+                          <m:t>(</m:t>
+                        </m:r>
+                        <m:r>
+                          <a:rPr lang="en-US" b="0" i="1" smtClean="0">
+                            <a:latin typeface="Cambria Math" panose="02040503050406030204" pitchFamily="18" charset="0"/>
+                          </a:rPr>
+                          <m:t>𝑛</m:t>
+                        </m:r>
+                      </m:e>
+                      <m:sup>
+                        <m:r>
+                          <a:rPr lang="en-US" b="0" i="1" smtClean="0">
+                            <a:latin typeface="Cambria Math" panose="02040503050406030204" pitchFamily="18" charset="0"/>
+                          </a:rPr>
+                          <m:t>3</m:t>
+                        </m:r>
+                      </m:sup>
+                    </m:sSup>
+                    <m:r>
+                      <a:rPr lang="en-US" b="0" i="1" smtClean="0">
+                        <a:latin typeface="Cambria Math" panose="02040503050406030204" pitchFamily="18" charset="0"/>
+                      </a:rPr>
+                      <m:t>)</m:t>
+                    </m:r>
+                  </m:oMath>
+                </a14:m>
+                <a:r>
+                  <a:rPr lang="en-US" dirty="0"/>
+                  <a:t>and </a:t>
+                </a:r>
+                <a14:m>
+                  <m:oMath xmlns:m="http://schemas.openxmlformats.org/officeDocument/2006/math">
+                    <m:r>
+                      <a:rPr lang="en-US" i="1">
+                        <a:latin typeface="Cambria Math" panose="02040503050406030204" pitchFamily="18" charset="0"/>
+                      </a:rPr>
+                      <m:t>𝑇</m:t>
+                    </m:r>
+                    <m:r>
+                      <a:rPr lang="en-US" i="1">
+                        <a:latin typeface="Cambria Math" panose="02040503050406030204" pitchFamily="18" charset="0"/>
+                      </a:rPr>
+                      <m:t>(</m:t>
+                    </m:r>
+                    <m:r>
+                      <a:rPr lang="en-US" i="1">
+                        <a:latin typeface="Cambria Math" panose="02040503050406030204" pitchFamily="18" charset="0"/>
+                      </a:rPr>
+                      <m:t>𝑛</m:t>
+                    </m:r>
+                    <m:r>
+                      <a:rPr lang="en-US" i="1">
+                        <a:latin typeface="Cambria Math" panose="02040503050406030204" pitchFamily="18" charset="0"/>
+                      </a:rPr>
+                      <m:t>)</m:t>
+                    </m:r>
+                  </m:oMath>
+                </a14:m>
+                <a:r>
+                  <a:rPr lang="en-US" dirty="0"/>
+                  <a:t> is in </a:t>
+                </a:r>
+                <a14:m>
+                  <m:oMath xmlns:m="http://schemas.openxmlformats.org/officeDocument/2006/math">
+                    <m:r>
+                      <m:rPr>
+                        <m:sty m:val="p"/>
+                      </m:rPr>
+                      <a:rPr lang="el-GR" i="1" smtClean="0">
+                        <a:latin typeface="Cambria Math" panose="02040503050406030204" pitchFamily="18" charset="0"/>
+                        <a:ea typeface="Cambria Math" panose="02040503050406030204" pitchFamily="18" charset="0"/>
+                      </a:rPr>
+                      <m:t>Ω</m:t>
+                    </m:r>
+                    <m:r>
+                      <a:rPr lang="en-US" b="0" i="1" smtClean="0">
+                        <a:latin typeface="Cambria Math" panose="02040503050406030204" pitchFamily="18" charset="0"/>
+                        <a:ea typeface="Cambria Math" panose="02040503050406030204" pitchFamily="18" charset="0"/>
+                      </a:rPr>
+                      <m:t>(1)</m:t>
+                    </m:r>
+                  </m:oMath>
+                </a14:m>
+                <a:r>
+                  <a:rPr lang="en-US" dirty="0"/>
+                  <a:t>?</a:t>
+                </a:r>
+              </a:p>
+            </p:txBody>
+          </p:sp>
+        </mc:Choice>
+        <mc:Fallback>
+          <p:sp>
+            <p:nvSpPr>
+              <p:cNvPr id="3" name="Content Placeholder 2">
+                <a:extLst>
+                  <a:ext uri="{FF2B5EF4-FFF2-40B4-BE49-F238E27FC236}">
+                    <a16:creationId xmlns:a16="http://schemas.microsoft.com/office/drawing/2014/main" id="{3C5AFB61-F6AB-B0A0-DED1-D443C59FA180}"/>
+                  </a:ext>
+                </a:extLst>
+              </p:cNvPr>
+              <p:cNvSpPr>
+                <a:spLocks noGrp="1" noRot="1" noChangeAspect="1" noMove="1" noResize="1" noEditPoints="1" noAdjustHandles="1" noChangeArrowheads="1" noChangeShapeType="1" noTextEdit="1"/>
+              </p:cNvSpPr>
+              <p:nvPr>
+                <p:ph idx="1"/>
+              </p:nvPr>
+            </p:nvSpPr>
+            <p:spPr>
+              <a:blipFill>
+                <a:blip r:embed="rId2"/>
+                <a:stretch>
+                  <a:fillRect l="-243"/>
+                </a:stretch>
+              </a:blipFill>
+            </p:spPr>
+            <p:txBody>
+              <a:bodyPr/>
+              <a:lstStyle/>
+              <a:p>
+                <a:r>
+                  <a:rPr lang="en-US">
+                    <a:noFill/>
+                  </a:rPr>
+                  <a:t> </a:t>
+                </a:r>
+              </a:p>
+            </p:txBody>
+          </p:sp>
+        </mc:Fallback>
+      </mc:AlternateContent>
       <p:sp>
         <p:nvSpPr>
           <p:cNvPr id="4" name="Date Placeholder 3">
             <a:extLst>
               <a:ext uri="{FF2B5EF4-FFF2-40B4-BE49-F238E27FC236}">
-                <a16:creationId xmlns:a16="http://schemas.microsoft.com/office/drawing/2014/main" id="{2DE3A39E-352D-9943-4200-3B20E1D4A869}"/>
+                <a16:creationId xmlns:a16="http://schemas.microsoft.com/office/drawing/2014/main" id="{D7FEBE68-1C4B-0BCF-B863-7E4750B5967B}"/>
               </a:ext>
             </a:extLst>
           </p:cNvPr>
@@ -4313,31 +4940,14 @@
             <p:ph type="dt" sz="half" idx="10"/>
           </p:nvPr>
         </p:nvSpPr>
-        <p:spPr>
-          <a:xfrm>
-            <a:off x="877824" y="6356350"/>
-            <a:ext cx="2743200" cy="365125"/>
-          </a:xfrm>
-        </p:spPr>
-        <p:txBody>
-          <a:bodyPr anchor="ctr">
-            <a:normAutofit/>
-          </a:bodyPr>
-          <a:lstStyle/>
-          <a:p>
-            <a:pPr>
-              <a:spcAft>
-                <a:spcPts val="600"/>
-              </a:spcAft>
-            </a:pPr>
+        <p:spPr/>
+        <p:txBody>
+          <a:bodyPr/>
+          <a:lstStyle/>
+          <a:p>
             <a:fld id="{579F6069-8263-4296-913A-BC2234E8D32B}" type="datetime1">
               <a:rPr lang="en-US" smtClean="0"/>
-              <a:pPr>
-                <a:spcAft>
-                  <a:spcPts val="600"/>
-                </a:spcAft>
-              </a:pPr>
-              <a:t>2/8/24</a:t>
+              <a:t>2/9/24</a:t>
             </a:fld>
             <a:endParaRPr lang="en-US"/>
           </a:p>
@@ -4348,7 +4958,7 @@
           <p:cNvPr id="5" name="Footer Placeholder 4">
             <a:extLst>
               <a:ext uri="{FF2B5EF4-FFF2-40B4-BE49-F238E27FC236}">
-                <a16:creationId xmlns:a16="http://schemas.microsoft.com/office/drawing/2014/main" id="{1028CDD0-DC40-3245-D830-A5D2E065D35C}"/>
+                <a16:creationId xmlns:a16="http://schemas.microsoft.com/office/drawing/2014/main" id="{6906A8BD-6FAD-86F6-F251-4FDE6E1D5F48}"/>
               </a:ext>
             </a:extLst>
           </p:cNvPr>
@@ -4359,23 +4969,11 @@
             <p:ph type="ftr" sz="quarter" idx="11"/>
           </p:nvPr>
         </p:nvSpPr>
-        <p:spPr>
-          <a:xfrm>
-            <a:off x="7132320" y="6356350"/>
-            <a:ext cx="4297680" cy="365125"/>
-          </a:xfrm>
-        </p:spPr>
-        <p:txBody>
-          <a:bodyPr anchor="ctr">
-            <a:normAutofit/>
-          </a:bodyPr>
-          <a:lstStyle/>
-          <a:p>
-            <a:pPr>
-              <a:spcAft>
-                <a:spcPts val="600"/>
-              </a:spcAft>
-            </a:pPr>
+        <p:spPr/>
+        <p:txBody>
+          <a:bodyPr/>
+          <a:lstStyle/>
+          <a:p>
             <a:r>
               <a:rPr lang="en-US"/>
               <a:t>Sample Footer Text</a:t>
@@ -4388,7 +4986,7 @@
           <p:cNvPr id="6" name="Slide Number Placeholder 5">
             <a:extLst>
               <a:ext uri="{FF2B5EF4-FFF2-40B4-BE49-F238E27FC236}">
-                <a16:creationId xmlns:a16="http://schemas.microsoft.com/office/drawing/2014/main" id="{1DD9D6C8-F69C-047D-D6E7-AC7E12102883}"/>
+                <a16:creationId xmlns:a16="http://schemas.microsoft.com/office/drawing/2014/main" id="{B4FB365C-9F65-B4D8-4E75-D57B10897F90}"/>
               </a:ext>
             </a:extLst>
           </p:cNvPr>
@@ -4399,30 +4997,13 @@
             <p:ph type="sldNum" sz="quarter" idx="12"/>
           </p:nvPr>
         </p:nvSpPr>
-        <p:spPr>
-          <a:xfrm>
-            <a:off x="11429999" y="6356350"/>
-            <a:ext cx="521207" cy="365125"/>
-          </a:xfrm>
-        </p:spPr>
-        <p:txBody>
-          <a:bodyPr anchor="ctr">
-            <a:normAutofit/>
-          </a:bodyPr>
-          <a:lstStyle/>
-          <a:p>
-            <a:pPr>
-              <a:spcAft>
-                <a:spcPts val="600"/>
-              </a:spcAft>
-            </a:pPr>
+        <p:spPr/>
+        <p:txBody>
+          <a:bodyPr/>
+          <a:lstStyle/>
+          <a:p>
             <a:fld id="{C68AC1EC-23E2-4F0E-A5A4-674EC8DB954E}" type="slidenum">
               <a:rPr lang="en-US" smtClean="0"/>
-              <a:pPr>
-                <a:spcAft>
-                  <a:spcPts val="600"/>
-                </a:spcAft>
-              </a:pPr>
               <a:t>3</a:t>
             </a:fld>
             <a:endParaRPr lang="en-US"/>
@@ -4432,7 +5013,7 @@
     </p:spTree>
     <p:extLst>
       <p:ext uri="{BB962C8B-B14F-4D97-AF65-F5344CB8AC3E}">
-        <p14:creationId xmlns:p14="http://schemas.microsoft.com/office/powerpoint/2010/main" val="1119947211"/>
+        <p14:creationId xmlns:p14="http://schemas.microsoft.com/office/powerpoint/2010/main" val="3618789965"/>
       </p:ext>
     </p:extLst>
   </p:cSld>
@@ -4464,6 +5045,926 @@
           <p:cNvPr id="2" name="Title 1">
             <a:extLst>
               <a:ext uri="{FF2B5EF4-FFF2-40B4-BE49-F238E27FC236}">
+                <a16:creationId xmlns:a16="http://schemas.microsoft.com/office/drawing/2014/main" id="{43B8A5A9-CAF7-D2CA-DEF4-0F319E37359E}"/>
+              </a:ext>
+            </a:extLst>
+          </p:cNvPr>
+          <p:cNvSpPr>
+            <a:spLocks noGrp="1"/>
+          </p:cNvSpPr>
+          <p:nvPr>
+            <p:ph type="title"/>
+          </p:nvPr>
+        </p:nvSpPr>
+        <p:spPr>
+          <a:xfrm>
+            <a:off x="871108" y="588245"/>
+            <a:ext cx="10449784" cy="1265928"/>
+          </a:xfrm>
+        </p:spPr>
+        <p:txBody>
+          <a:bodyPr anchor="b">
+            <a:normAutofit/>
+          </a:bodyPr>
+          <a:lstStyle/>
+          <a:p>
+            <a:r>
+              <a:rPr lang="en-US" dirty="0"/>
+              <a:t>What is Big-O of the following code snippet?</a:t>
+            </a:r>
+          </a:p>
+        </p:txBody>
+      </p:sp>
+      <p:pic>
+        <p:nvPicPr>
+          <p:cNvPr id="7" name="Picture 6">
+            <a:extLst>
+              <a:ext uri="{FF2B5EF4-FFF2-40B4-BE49-F238E27FC236}">
+                <a16:creationId xmlns:a16="http://schemas.microsoft.com/office/drawing/2014/main" id="{E0C3DDAD-0FFC-1001-5E8D-36F897E67FAB}"/>
+              </a:ext>
+            </a:extLst>
+          </p:cNvPr>
+          <p:cNvPicPr>
+            <a:picLocks noChangeAspect="1"/>
+          </p:cNvPicPr>
+          <p:nvPr/>
+        </p:nvPicPr>
+        <p:blipFill>
+          <a:blip r:embed="rId2"/>
+          <a:stretch>
+            <a:fillRect/>
+          </a:stretch>
+        </p:blipFill>
+        <p:spPr>
+          <a:xfrm>
+            <a:off x="2030401" y="2157984"/>
+            <a:ext cx="8137293" cy="3903819"/>
+          </a:xfrm>
+          <a:prstGeom prst="rect">
+            <a:avLst/>
+          </a:prstGeom>
+          <a:noFill/>
+        </p:spPr>
+      </p:pic>
+      <p:sp>
+        <p:nvSpPr>
+          <p:cNvPr id="4" name="Date Placeholder 3">
+            <a:extLst>
+              <a:ext uri="{FF2B5EF4-FFF2-40B4-BE49-F238E27FC236}">
+                <a16:creationId xmlns:a16="http://schemas.microsoft.com/office/drawing/2014/main" id="{E5E8CB05-5CA8-CC9A-B3F1-B4B9D033F9ED}"/>
+              </a:ext>
+            </a:extLst>
+          </p:cNvPr>
+          <p:cNvSpPr>
+            <a:spLocks noGrp="1"/>
+          </p:cNvSpPr>
+          <p:nvPr>
+            <p:ph type="dt" sz="half" idx="10"/>
+          </p:nvPr>
+        </p:nvSpPr>
+        <p:spPr>
+          <a:xfrm>
+            <a:off x="877824" y="6356350"/>
+            <a:ext cx="2743200" cy="365125"/>
+          </a:xfrm>
+        </p:spPr>
+        <p:txBody>
+          <a:bodyPr anchor="ctr">
+            <a:normAutofit/>
+          </a:bodyPr>
+          <a:lstStyle/>
+          <a:p>
+            <a:pPr>
+              <a:spcAft>
+                <a:spcPts val="600"/>
+              </a:spcAft>
+            </a:pPr>
+            <a:fld id="{579F6069-8263-4296-913A-BC2234E8D32B}" type="datetime1">
+              <a:rPr lang="en-US" smtClean="0"/>
+              <a:pPr>
+                <a:spcAft>
+                  <a:spcPts val="600"/>
+                </a:spcAft>
+              </a:pPr>
+              <a:t>2/9/24</a:t>
+            </a:fld>
+            <a:endParaRPr lang="en-US"/>
+          </a:p>
+        </p:txBody>
+      </p:sp>
+      <p:sp>
+        <p:nvSpPr>
+          <p:cNvPr id="5" name="Footer Placeholder 4">
+            <a:extLst>
+              <a:ext uri="{FF2B5EF4-FFF2-40B4-BE49-F238E27FC236}">
+                <a16:creationId xmlns:a16="http://schemas.microsoft.com/office/drawing/2014/main" id="{D6A45E85-9BAE-6E1D-C857-66956FD17496}"/>
+              </a:ext>
+            </a:extLst>
+          </p:cNvPr>
+          <p:cNvSpPr>
+            <a:spLocks noGrp="1"/>
+          </p:cNvSpPr>
+          <p:nvPr>
+            <p:ph type="ftr" sz="quarter" idx="11"/>
+          </p:nvPr>
+        </p:nvSpPr>
+        <p:spPr>
+          <a:xfrm>
+            <a:off x="7132320" y="6356350"/>
+            <a:ext cx="4297680" cy="365125"/>
+          </a:xfrm>
+        </p:spPr>
+        <p:txBody>
+          <a:bodyPr anchor="ctr">
+            <a:normAutofit/>
+          </a:bodyPr>
+          <a:lstStyle/>
+          <a:p>
+            <a:pPr>
+              <a:spcAft>
+                <a:spcPts val="600"/>
+              </a:spcAft>
+            </a:pPr>
+            <a:r>
+              <a:rPr lang="en-US"/>
+              <a:t>Sample Footer Text</a:t>
+            </a:r>
+          </a:p>
+        </p:txBody>
+      </p:sp>
+      <p:sp>
+        <p:nvSpPr>
+          <p:cNvPr id="6" name="Slide Number Placeholder 5">
+            <a:extLst>
+              <a:ext uri="{FF2B5EF4-FFF2-40B4-BE49-F238E27FC236}">
+                <a16:creationId xmlns:a16="http://schemas.microsoft.com/office/drawing/2014/main" id="{F77F0790-DBD6-D34C-D1A1-6393AA9F8613}"/>
+              </a:ext>
+            </a:extLst>
+          </p:cNvPr>
+          <p:cNvSpPr>
+            <a:spLocks noGrp="1"/>
+          </p:cNvSpPr>
+          <p:nvPr>
+            <p:ph type="sldNum" sz="quarter" idx="12"/>
+          </p:nvPr>
+        </p:nvSpPr>
+        <p:spPr>
+          <a:xfrm>
+            <a:off x="11429999" y="6356350"/>
+            <a:ext cx="521207" cy="365125"/>
+          </a:xfrm>
+        </p:spPr>
+        <p:txBody>
+          <a:bodyPr anchor="ctr">
+            <a:normAutofit/>
+          </a:bodyPr>
+          <a:lstStyle/>
+          <a:p>
+            <a:pPr>
+              <a:spcAft>
+                <a:spcPts val="600"/>
+              </a:spcAft>
+            </a:pPr>
+            <a:fld id="{C68AC1EC-23E2-4F0E-A5A4-674EC8DB954E}" type="slidenum">
+              <a:rPr lang="en-US" smtClean="0"/>
+              <a:pPr>
+                <a:spcAft>
+                  <a:spcPts val="600"/>
+                </a:spcAft>
+              </a:pPr>
+              <a:t>4</a:t>
+            </a:fld>
+            <a:endParaRPr lang="en-US"/>
+          </a:p>
+        </p:txBody>
+      </p:sp>
+    </p:spTree>
+    <p:extLst>
+      <p:ext uri="{BB962C8B-B14F-4D97-AF65-F5344CB8AC3E}">
+        <p14:creationId xmlns:p14="http://schemas.microsoft.com/office/powerpoint/2010/main" val="596331095"/>
+      </p:ext>
+    </p:extLst>
+  </p:cSld>
+  <p:clrMapOvr>
+    <a:masterClrMapping/>
+  </p:clrMapOvr>
+</p:sld>
+</file>
+
+<file path=ppt/slides/slide5.xml><?xml version="1.0" encoding="utf-8"?>
+<p:sld xmlns:a="http://schemas.openxmlformats.org/drawingml/2006/main" xmlns:r="http://schemas.openxmlformats.org/officeDocument/2006/relationships" xmlns:p="http://schemas.openxmlformats.org/presentationml/2006/main">
+  <p:cSld>
+    <p:spTree>
+      <p:nvGrpSpPr>
+        <p:cNvPr id="1" name="">
+          <a:extLst>
+            <a:ext uri="{FF2B5EF4-FFF2-40B4-BE49-F238E27FC236}">
+              <a16:creationId xmlns:a16="http://schemas.microsoft.com/office/drawing/2014/main" id="{388E5643-27E7-4DE4-67A1-927383C0F6BE}"/>
+            </a:ext>
+          </a:extLst>
+        </p:cNvPr>
+        <p:cNvGrpSpPr/>
+        <p:nvPr/>
+      </p:nvGrpSpPr>
+      <p:grpSpPr>
+        <a:xfrm>
+          <a:off x="0" y="0"/>
+          <a:ext cx="0" cy="0"/>
+          <a:chOff x="0" y="0"/>
+          <a:chExt cx="0" cy="0"/>
+        </a:xfrm>
+      </p:grpSpPr>
+      <p:sp>
+        <p:nvSpPr>
+          <p:cNvPr id="2" name="Title 1">
+            <a:extLst>
+              <a:ext uri="{FF2B5EF4-FFF2-40B4-BE49-F238E27FC236}">
+                <a16:creationId xmlns:a16="http://schemas.microsoft.com/office/drawing/2014/main" id="{58855680-EFDD-8316-E960-85233D5940CA}"/>
+              </a:ext>
+            </a:extLst>
+          </p:cNvPr>
+          <p:cNvSpPr>
+            <a:spLocks noGrp="1"/>
+          </p:cNvSpPr>
+          <p:nvPr>
+            <p:ph type="title"/>
+          </p:nvPr>
+        </p:nvSpPr>
+        <p:spPr>
+          <a:xfrm>
+            <a:off x="871108" y="588245"/>
+            <a:ext cx="10449784" cy="1265928"/>
+          </a:xfrm>
+        </p:spPr>
+        <p:txBody>
+          <a:bodyPr anchor="b">
+            <a:normAutofit/>
+          </a:bodyPr>
+          <a:lstStyle/>
+          <a:p>
+            <a:r>
+              <a:rPr lang="en-US" dirty="0"/>
+              <a:t>What is Big-O of the following code snippet?</a:t>
+            </a:r>
+          </a:p>
+        </p:txBody>
+      </p:sp>
+      <p:pic>
+        <p:nvPicPr>
+          <p:cNvPr id="7" name="Picture 6">
+            <a:extLst>
+              <a:ext uri="{FF2B5EF4-FFF2-40B4-BE49-F238E27FC236}">
+                <a16:creationId xmlns:a16="http://schemas.microsoft.com/office/drawing/2014/main" id="{14C42B1D-E13F-3E01-2164-BDC1E1F6840A}"/>
+              </a:ext>
+            </a:extLst>
+          </p:cNvPr>
+          <p:cNvPicPr>
+            <a:picLocks noChangeAspect="1"/>
+          </p:cNvPicPr>
+          <p:nvPr/>
+        </p:nvPicPr>
+        <p:blipFill>
+          <a:blip r:embed="rId2"/>
+          <a:stretch>
+            <a:fillRect/>
+          </a:stretch>
+        </p:blipFill>
+        <p:spPr>
+          <a:xfrm>
+            <a:off x="3006975" y="2157984"/>
+            <a:ext cx="6184145" cy="3903819"/>
+          </a:xfrm>
+          <a:prstGeom prst="rect">
+            <a:avLst/>
+          </a:prstGeom>
+          <a:noFill/>
+        </p:spPr>
+      </p:pic>
+      <p:sp>
+        <p:nvSpPr>
+          <p:cNvPr id="4" name="Date Placeholder 3">
+            <a:extLst>
+              <a:ext uri="{FF2B5EF4-FFF2-40B4-BE49-F238E27FC236}">
+                <a16:creationId xmlns:a16="http://schemas.microsoft.com/office/drawing/2014/main" id="{59C39B99-D30E-C0C4-21B1-C292F24E3CFB}"/>
+              </a:ext>
+            </a:extLst>
+          </p:cNvPr>
+          <p:cNvSpPr>
+            <a:spLocks noGrp="1"/>
+          </p:cNvSpPr>
+          <p:nvPr>
+            <p:ph type="dt" sz="half" idx="10"/>
+          </p:nvPr>
+        </p:nvSpPr>
+        <p:spPr>
+          <a:xfrm>
+            <a:off x="877824" y="6356350"/>
+            <a:ext cx="2743200" cy="365125"/>
+          </a:xfrm>
+        </p:spPr>
+        <p:txBody>
+          <a:bodyPr anchor="ctr">
+            <a:normAutofit/>
+          </a:bodyPr>
+          <a:lstStyle/>
+          <a:p>
+            <a:pPr>
+              <a:spcAft>
+                <a:spcPts val="600"/>
+              </a:spcAft>
+            </a:pPr>
+            <a:fld id="{579F6069-8263-4296-913A-BC2234E8D32B}" type="datetime1">
+              <a:rPr lang="en-US" smtClean="0"/>
+              <a:pPr>
+                <a:spcAft>
+                  <a:spcPts val="600"/>
+                </a:spcAft>
+              </a:pPr>
+              <a:t>2/9/24</a:t>
+            </a:fld>
+            <a:endParaRPr lang="en-US"/>
+          </a:p>
+        </p:txBody>
+      </p:sp>
+      <p:sp>
+        <p:nvSpPr>
+          <p:cNvPr id="5" name="Footer Placeholder 4">
+            <a:extLst>
+              <a:ext uri="{FF2B5EF4-FFF2-40B4-BE49-F238E27FC236}">
+                <a16:creationId xmlns:a16="http://schemas.microsoft.com/office/drawing/2014/main" id="{832D260E-F93F-92BA-F214-3F15CF250402}"/>
+              </a:ext>
+            </a:extLst>
+          </p:cNvPr>
+          <p:cNvSpPr>
+            <a:spLocks noGrp="1"/>
+          </p:cNvSpPr>
+          <p:nvPr>
+            <p:ph type="ftr" sz="quarter" idx="11"/>
+          </p:nvPr>
+        </p:nvSpPr>
+        <p:spPr>
+          <a:xfrm>
+            <a:off x="7132320" y="6356350"/>
+            <a:ext cx="4297680" cy="365125"/>
+          </a:xfrm>
+        </p:spPr>
+        <p:txBody>
+          <a:bodyPr anchor="ctr">
+            <a:normAutofit/>
+          </a:bodyPr>
+          <a:lstStyle/>
+          <a:p>
+            <a:pPr>
+              <a:spcAft>
+                <a:spcPts val="600"/>
+              </a:spcAft>
+            </a:pPr>
+            <a:r>
+              <a:rPr lang="en-US"/>
+              <a:t>Sample Footer Text</a:t>
+            </a:r>
+          </a:p>
+        </p:txBody>
+      </p:sp>
+      <p:sp>
+        <p:nvSpPr>
+          <p:cNvPr id="6" name="Slide Number Placeholder 5">
+            <a:extLst>
+              <a:ext uri="{FF2B5EF4-FFF2-40B4-BE49-F238E27FC236}">
+                <a16:creationId xmlns:a16="http://schemas.microsoft.com/office/drawing/2014/main" id="{7FDBE023-49DC-9421-9B8B-C8A4A907CC5A}"/>
+              </a:ext>
+            </a:extLst>
+          </p:cNvPr>
+          <p:cNvSpPr>
+            <a:spLocks noGrp="1"/>
+          </p:cNvSpPr>
+          <p:nvPr>
+            <p:ph type="sldNum" sz="quarter" idx="12"/>
+          </p:nvPr>
+        </p:nvSpPr>
+        <p:spPr>
+          <a:xfrm>
+            <a:off x="11429999" y="6356350"/>
+            <a:ext cx="521207" cy="365125"/>
+          </a:xfrm>
+        </p:spPr>
+        <p:txBody>
+          <a:bodyPr anchor="ctr">
+            <a:normAutofit/>
+          </a:bodyPr>
+          <a:lstStyle/>
+          <a:p>
+            <a:pPr>
+              <a:spcAft>
+                <a:spcPts val="600"/>
+              </a:spcAft>
+            </a:pPr>
+            <a:fld id="{C68AC1EC-23E2-4F0E-A5A4-674EC8DB954E}" type="slidenum">
+              <a:rPr lang="en-US" smtClean="0"/>
+              <a:pPr>
+                <a:spcAft>
+                  <a:spcPts val="600"/>
+                </a:spcAft>
+              </a:pPr>
+              <a:t>5</a:t>
+            </a:fld>
+            <a:endParaRPr lang="en-US"/>
+          </a:p>
+        </p:txBody>
+      </p:sp>
+    </p:spTree>
+    <p:extLst>
+      <p:ext uri="{BB962C8B-B14F-4D97-AF65-F5344CB8AC3E}">
+        <p14:creationId xmlns:p14="http://schemas.microsoft.com/office/powerpoint/2010/main" val="2654580552"/>
+      </p:ext>
+    </p:extLst>
+  </p:cSld>
+  <p:clrMapOvr>
+    <a:masterClrMapping/>
+  </p:clrMapOvr>
+</p:sld>
+</file>
+
+<file path=ppt/slides/slide6.xml><?xml version="1.0" encoding="utf-8"?>
+<p:sld xmlns:a="http://schemas.openxmlformats.org/drawingml/2006/main" xmlns:r="http://schemas.openxmlformats.org/officeDocument/2006/relationships" xmlns:p="http://schemas.openxmlformats.org/presentationml/2006/main">
+  <p:cSld>
+    <p:spTree>
+      <p:nvGrpSpPr>
+        <p:cNvPr id="1" name=""/>
+        <p:cNvGrpSpPr/>
+        <p:nvPr/>
+      </p:nvGrpSpPr>
+      <p:grpSpPr>
+        <a:xfrm>
+          <a:off x="0" y="0"/>
+          <a:ext cx="0" cy="0"/>
+          <a:chOff x="0" y="0"/>
+          <a:chExt cx="0" cy="0"/>
+        </a:xfrm>
+      </p:grpSpPr>
+      <p:sp>
+        <p:nvSpPr>
+          <p:cNvPr id="2" name="Title 1">
+            <a:extLst>
+              <a:ext uri="{FF2B5EF4-FFF2-40B4-BE49-F238E27FC236}">
+                <a16:creationId xmlns:a16="http://schemas.microsoft.com/office/drawing/2014/main" id="{5E16BE8B-5FA9-46F2-3B9E-99D38C45B3F8}"/>
+              </a:ext>
+            </a:extLst>
+          </p:cNvPr>
+          <p:cNvSpPr>
+            <a:spLocks noGrp="1"/>
+          </p:cNvSpPr>
+          <p:nvPr>
+            <p:ph type="title"/>
+          </p:nvPr>
+        </p:nvSpPr>
+        <p:spPr>
+          <a:xfrm>
+            <a:off x="871108" y="588245"/>
+            <a:ext cx="10449784" cy="1265928"/>
+          </a:xfrm>
+        </p:spPr>
+        <p:txBody>
+          <a:bodyPr anchor="b">
+            <a:normAutofit/>
+          </a:bodyPr>
+          <a:lstStyle/>
+          <a:p>
+            <a:r>
+              <a:rPr lang="en-US" dirty="0" err="1"/>
+              <a:t>OpCountExamples.replaceFirstX</a:t>
+            </a:r>
+            <a:endParaRPr lang="en-US" dirty="0"/>
+          </a:p>
+        </p:txBody>
+      </p:sp>
+      <p:pic>
+        <p:nvPicPr>
+          <p:cNvPr id="6" name="Picture 5">
+            <a:extLst>
+              <a:ext uri="{FF2B5EF4-FFF2-40B4-BE49-F238E27FC236}">
+                <a16:creationId xmlns:a16="http://schemas.microsoft.com/office/drawing/2014/main" id="{B9D131E5-B640-5756-0834-E5D302A280A0}"/>
+              </a:ext>
+            </a:extLst>
+          </p:cNvPr>
+          <p:cNvPicPr>
+            <a:picLocks noChangeAspect="1"/>
+          </p:cNvPicPr>
+          <p:nvPr/>
+        </p:nvPicPr>
+        <p:blipFill>
+          <a:blip r:embed="rId2"/>
+          <a:stretch>
+            <a:fillRect/>
+          </a:stretch>
+        </p:blipFill>
+        <p:spPr>
+          <a:xfrm>
+            <a:off x="1559722" y="2157984"/>
+            <a:ext cx="9078651" cy="3903819"/>
+          </a:xfrm>
+          <a:prstGeom prst="rect">
+            <a:avLst/>
+          </a:prstGeom>
+          <a:noFill/>
+        </p:spPr>
+      </p:pic>
+      <p:sp>
+        <p:nvSpPr>
+          <p:cNvPr id="3" name="Date Placeholder 2">
+            <a:extLst>
+              <a:ext uri="{FF2B5EF4-FFF2-40B4-BE49-F238E27FC236}">
+                <a16:creationId xmlns:a16="http://schemas.microsoft.com/office/drawing/2014/main" id="{A45E03F1-E569-AD34-030B-D4FCF30CC705}"/>
+              </a:ext>
+            </a:extLst>
+          </p:cNvPr>
+          <p:cNvSpPr>
+            <a:spLocks noGrp="1"/>
+          </p:cNvSpPr>
+          <p:nvPr>
+            <p:ph type="dt" sz="half" idx="10"/>
+          </p:nvPr>
+        </p:nvSpPr>
+        <p:spPr>
+          <a:xfrm>
+            <a:off x="877824" y="6356350"/>
+            <a:ext cx="2743200" cy="365125"/>
+          </a:xfrm>
+        </p:spPr>
+        <p:txBody>
+          <a:bodyPr anchor="ctr">
+            <a:normAutofit/>
+          </a:bodyPr>
+          <a:lstStyle/>
+          <a:p>
+            <a:pPr>
+              <a:spcAft>
+                <a:spcPts val="600"/>
+              </a:spcAft>
+            </a:pPr>
+            <a:fld id="{5892AC11-ACC3-4129-BBD7-C580BF1A4EE7}" type="datetime1">
+              <a:rPr lang="en-US" smtClean="0"/>
+              <a:pPr>
+                <a:spcAft>
+                  <a:spcPts val="600"/>
+                </a:spcAft>
+              </a:pPr>
+              <a:t>2/9/24</a:t>
+            </a:fld>
+            <a:endParaRPr lang="en-US"/>
+          </a:p>
+        </p:txBody>
+      </p:sp>
+      <p:sp>
+        <p:nvSpPr>
+          <p:cNvPr id="4" name="Footer Placeholder 3">
+            <a:extLst>
+              <a:ext uri="{FF2B5EF4-FFF2-40B4-BE49-F238E27FC236}">
+                <a16:creationId xmlns:a16="http://schemas.microsoft.com/office/drawing/2014/main" id="{C1A25634-6A83-80FF-2AC6-41206D12693C}"/>
+              </a:ext>
+            </a:extLst>
+          </p:cNvPr>
+          <p:cNvSpPr>
+            <a:spLocks noGrp="1"/>
+          </p:cNvSpPr>
+          <p:nvPr>
+            <p:ph type="ftr" sz="quarter" idx="11"/>
+          </p:nvPr>
+        </p:nvSpPr>
+        <p:spPr>
+          <a:xfrm>
+            <a:off x="7132320" y="6356350"/>
+            <a:ext cx="4297680" cy="365125"/>
+          </a:xfrm>
+        </p:spPr>
+        <p:txBody>
+          <a:bodyPr anchor="ctr">
+            <a:normAutofit/>
+          </a:bodyPr>
+          <a:lstStyle/>
+          <a:p>
+            <a:pPr>
+              <a:spcAft>
+                <a:spcPts val="600"/>
+              </a:spcAft>
+            </a:pPr>
+            <a:r>
+              <a:rPr lang="en-US"/>
+              <a:t>Sample Footer Text</a:t>
+            </a:r>
+          </a:p>
+        </p:txBody>
+      </p:sp>
+      <p:sp>
+        <p:nvSpPr>
+          <p:cNvPr id="5" name="Slide Number Placeholder 4">
+            <a:extLst>
+              <a:ext uri="{FF2B5EF4-FFF2-40B4-BE49-F238E27FC236}">
+                <a16:creationId xmlns:a16="http://schemas.microsoft.com/office/drawing/2014/main" id="{C69D2AD7-265F-5E42-4480-B773B7A07BD0}"/>
+              </a:ext>
+            </a:extLst>
+          </p:cNvPr>
+          <p:cNvSpPr>
+            <a:spLocks noGrp="1"/>
+          </p:cNvSpPr>
+          <p:nvPr>
+            <p:ph type="sldNum" sz="quarter" idx="12"/>
+          </p:nvPr>
+        </p:nvSpPr>
+        <p:spPr>
+          <a:xfrm>
+            <a:off x="11429999" y="6356350"/>
+            <a:ext cx="521207" cy="365125"/>
+          </a:xfrm>
+        </p:spPr>
+        <p:txBody>
+          <a:bodyPr anchor="ctr">
+            <a:normAutofit/>
+          </a:bodyPr>
+          <a:lstStyle/>
+          <a:p>
+            <a:pPr>
+              <a:spcAft>
+                <a:spcPts val="600"/>
+              </a:spcAft>
+            </a:pPr>
+            <a:fld id="{C68AC1EC-23E2-4F0E-A5A4-674EC8DB954E}" type="slidenum">
+              <a:rPr lang="en-US" smtClean="0"/>
+              <a:pPr>
+                <a:spcAft>
+                  <a:spcPts val="600"/>
+                </a:spcAft>
+              </a:pPr>
+              <a:t>6</a:t>
+            </a:fld>
+            <a:endParaRPr lang="en-US"/>
+          </a:p>
+        </p:txBody>
+      </p:sp>
+    </p:spTree>
+    <p:extLst>
+      <p:ext uri="{BB962C8B-B14F-4D97-AF65-F5344CB8AC3E}">
+        <p14:creationId xmlns:p14="http://schemas.microsoft.com/office/powerpoint/2010/main" val="13563772"/>
+      </p:ext>
+    </p:extLst>
+  </p:cSld>
+  <p:clrMapOvr>
+    <a:masterClrMapping/>
+  </p:clrMapOvr>
+</p:sld>
+</file>
+
+<file path=ppt/slides/slide7.xml><?xml version="1.0" encoding="utf-8"?>
+<p:sld xmlns:a="http://schemas.openxmlformats.org/drawingml/2006/main" xmlns:r="http://schemas.openxmlformats.org/officeDocument/2006/relationships" xmlns:p="http://schemas.openxmlformats.org/presentationml/2006/main">
+  <p:cSld>
+    <p:spTree>
+      <p:nvGrpSpPr>
+        <p:cNvPr id="1" name=""/>
+        <p:cNvGrpSpPr/>
+        <p:nvPr/>
+      </p:nvGrpSpPr>
+      <p:grpSpPr>
+        <a:xfrm>
+          <a:off x="0" y="0"/>
+          <a:ext cx="0" cy="0"/>
+          <a:chOff x="0" y="0"/>
+          <a:chExt cx="0" cy="0"/>
+        </a:xfrm>
+      </p:grpSpPr>
+      <p:sp>
+        <p:nvSpPr>
+          <p:cNvPr id="2" name="Title 1">
+            <a:extLst>
+              <a:ext uri="{FF2B5EF4-FFF2-40B4-BE49-F238E27FC236}">
+                <a16:creationId xmlns:a16="http://schemas.microsoft.com/office/drawing/2014/main" id="{A8EF3A35-9AAE-221F-D22C-DF5CF26714AD}"/>
+              </a:ext>
+            </a:extLst>
+          </p:cNvPr>
+          <p:cNvSpPr>
+            <a:spLocks noGrp="1"/>
+          </p:cNvSpPr>
+          <p:nvPr>
+            <p:ph type="title"/>
+          </p:nvPr>
+        </p:nvSpPr>
+        <p:spPr>
+          <a:xfrm>
+            <a:off x="871108" y="588245"/>
+            <a:ext cx="10449784" cy="1265928"/>
+          </a:xfrm>
+        </p:spPr>
+        <p:txBody>
+          <a:bodyPr anchor="b">
+            <a:normAutofit/>
+          </a:bodyPr>
+          <a:lstStyle/>
+          <a:p>
+            <a:r>
+              <a:rPr lang="en-US" dirty="0" err="1"/>
+              <a:t>OpCountExample.mostFrequentValue</a:t>
+            </a:r>
+            <a:endParaRPr lang="en-US" dirty="0"/>
+          </a:p>
+        </p:txBody>
+      </p:sp>
+      <p:pic>
+        <p:nvPicPr>
+          <p:cNvPr id="7" name="Picture 6">
+            <a:extLst>
+              <a:ext uri="{FF2B5EF4-FFF2-40B4-BE49-F238E27FC236}">
+                <a16:creationId xmlns:a16="http://schemas.microsoft.com/office/drawing/2014/main" id="{7456D16A-6992-482A-D396-0C29748A579C}"/>
+              </a:ext>
+            </a:extLst>
+          </p:cNvPr>
+          <p:cNvPicPr>
+            <a:picLocks noChangeAspect="1"/>
+          </p:cNvPicPr>
+          <p:nvPr/>
+        </p:nvPicPr>
+        <p:blipFill>
+          <a:blip r:embed="rId2"/>
+          <a:stretch>
+            <a:fillRect/>
+          </a:stretch>
+        </p:blipFill>
+        <p:spPr>
+          <a:xfrm>
+            <a:off x="2899197" y="2157984"/>
+            <a:ext cx="6399702" cy="3903819"/>
+          </a:xfrm>
+          <a:prstGeom prst="rect">
+            <a:avLst/>
+          </a:prstGeom>
+          <a:noFill/>
+        </p:spPr>
+      </p:pic>
+      <p:sp>
+        <p:nvSpPr>
+          <p:cNvPr id="4" name="Date Placeholder 3">
+            <a:extLst>
+              <a:ext uri="{FF2B5EF4-FFF2-40B4-BE49-F238E27FC236}">
+                <a16:creationId xmlns:a16="http://schemas.microsoft.com/office/drawing/2014/main" id="{2DE3A39E-352D-9943-4200-3B20E1D4A869}"/>
+              </a:ext>
+            </a:extLst>
+          </p:cNvPr>
+          <p:cNvSpPr>
+            <a:spLocks noGrp="1"/>
+          </p:cNvSpPr>
+          <p:nvPr>
+            <p:ph type="dt" sz="half" idx="10"/>
+          </p:nvPr>
+        </p:nvSpPr>
+        <p:spPr>
+          <a:xfrm>
+            <a:off x="877824" y="6356350"/>
+            <a:ext cx="2743200" cy="365125"/>
+          </a:xfrm>
+        </p:spPr>
+        <p:txBody>
+          <a:bodyPr anchor="ctr">
+            <a:normAutofit/>
+          </a:bodyPr>
+          <a:lstStyle/>
+          <a:p>
+            <a:pPr>
+              <a:spcAft>
+                <a:spcPts val="600"/>
+              </a:spcAft>
+            </a:pPr>
+            <a:fld id="{579F6069-8263-4296-913A-BC2234E8D32B}" type="datetime1">
+              <a:rPr lang="en-US" smtClean="0"/>
+              <a:pPr>
+                <a:spcAft>
+                  <a:spcPts val="600"/>
+                </a:spcAft>
+              </a:pPr>
+              <a:t>2/9/24</a:t>
+            </a:fld>
+            <a:endParaRPr lang="en-US"/>
+          </a:p>
+        </p:txBody>
+      </p:sp>
+      <p:sp>
+        <p:nvSpPr>
+          <p:cNvPr id="5" name="Footer Placeholder 4">
+            <a:extLst>
+              <a:ext uri="{FF2B5EF4-FFF2-40B4-BE49-F238E27FC236}">
+                <a16:creationId xmlns:a16="http://schemas.microsoft.com/office/drawing/2014/main" id="{1028CDD0-DC40-3245-D830-A5D2E065D35C}"/>
+              </a:ext>
+            </a:extLst>
+          </p:cNvPr>
+          <p:cNvSpPr>
+            <a:spLocks noGrp="1"/>
+          </p:cNvSpPr>
+          <p:nvPr>
+            <p:ph type="ftr" sz="quarter" idx="11"/>
+          </p:nvPr>
+        </p:nvSpPr>
+        <p:spPr>
+          <a:xfrm>
+            <a:off x="7132320" y="6356350"/>
+            <a:ext cx="4297680" cy="365125"/>
+          </a:xfrm>
+        </p:spPr>
+        <p:txBody>
+          <a:bodyPr anchor="ctr">
+            <a:normAutofit/>
+          </a:bodyPr>
+          <a:lstStyle/>
+          <a:p>
+            <a:pPr>
+              <a:spcAft>
+                <a:spcPts val="600"/>
+              </a:spcAft>
+            </a:pPr>
+            <a:r>
+              <a:rPr lang="en-US"/>
+              <a:t>Sample Footer Text</a:t>
+            </a:r>
+          </a:p>
+        </p:txBody>
+      </p:sp>
+      <p:sp>
+        <p:nvSpPr>
+          <p:cNvPr id="6" name="Slide Number Placeholder 5">
+            <a:extLst>
+              <a:ext uri="{FF2B5EF4-FFF2-40B4-BE49-F238E27FC236}">
+                <a16:creationId xmlns:a16="http://schemas.microsoft.com/office/drawing/2014/main" id="{1DD9D6C8-F69C-047D-D6E7-AC7E12102883}"/>
+              </a:ext>
+            </a:extLst>
+          </p:cNvPr>
+          <p:cNvSpPr>
+            <a:spLocks noGrp="1"/>
+          </p:cNvSpPr>
+          <p:nvPr>
+            <p:ph type="sldNum" sz="quarter" idx="12"/>
+          </p:nvPr>
+        </p:nvSpPr>
+        <p:spPr>
+          <a:xfrm>
+            <a:off x="11429999" y="6356350"/>
+            <a:ext cx="521207" cy="365125"/>
+          </a:xfrm>
+        </p:spPr>
+        <p:txBody>
+          <a:bodyPr anchor="ctr">
+            <a:normAutofit/>
+          </a:bodyPr>
+          <a:lstStyle/>
+          <a:p>
+            <a:pPr>
+              <a:spcAft>
+                <a:spcPts val="600"/>
+              </a:spcAft>
+            </a:pPr>
+            <a:fld id="{C68AC1EC-23E2-4F0E-A5A4-674EC8DB954E}" type="slidenum">
+              <a:rPr lang="en-US" smtClean="0"/>
+              <a:pPr>
+                <a:spcAft>
+                  <a:spcPts val="600"/>
+                </a:spcAft>
+              </a:pPr>
+              <a:t>7</a:t>
+            </a:fld>
+            <a:endParaRPr lang="en-US"/>
+          </a:p>
+        </p:txBody>
+      </p:sp>
+    </p:spTree>
+    <p:extLst>
+      <p:ext uri="{BB962C8B-B14F-4D97-AF65-F5344CB8AC3E}">
+        <p14:creationId xmlns:p14="http://schemas.microsoft.com/office/powerpoint/2010/main" val="1119947211"/>
+      </p:ext>
+    </p:extLst>
+  </p:cSld>
+  <p:clrMapOvr>
+    <a:masterClrMapping/>
+  </p:clrMapOvr>
+</p:sld>
+</file>
+
+<file path=ppt/slides/slide8.xml><?xml version="1.0" encoding="utf-8"?>
+<p:sld xmlns:a="http://schemas.openxmlformats.org/drawingml/2006/main" xmlns:r="http://schemas.openxmlformats.org/officeDocument/2006/relationships" xmlns:p="http://schemas.openxmlformats.org/presentationml/2006/main">
+  <p:cSld>
+    <p:spTree>
+      <p:nvGrpSpPr>
+        <p:cNvPr id="1" name=""/>
+        <p:cNvGrpSpPr/>
+        <p:nvPr/>
+      </p:nvGrpSpPr>
+      <p:grpSpPr>
+        <a:xfrm>
+          <a:off x="0" y="0"/>
+          <a:ext cx="0" cy="0"/>
+          <a:chOff x="0" y="0"/>
+          <a:chExt cx="0" cy="0"/>
+        </a:xfrm>
+      </p:grpSpPr>
+      <p:sp>
+        <p:nvSpPr>
+          <p:cNvPr id="2" name="Title 1">
+            <a:extLst>
+              <a:ext uri="{FF2B5EF4-FFF2-40B4-BE49-F238E27FC236}">
                 <a16:creationId xmlns:a16="http://schemas.microsoft.com/office/drawing/2014/main" id="{601C827A-A6F2-82B3-1BF2-A462F57B4570}"/>
               </a:ext>
             </a:extLst>
@@ -4566,7 +6067,7 @@
                   <a:spcPts val="600"/>
                 </a:spcAft>
               </a:pPr>
-              <a:t>2/8/24</a:t>
+              <a:t>2/9/24</a:t>
             </a:fld>
             <a:endParaRPr lang="en-US"/>
           </a:p>
@@ -4652,7 +6153,7 @@
                   <a:spcPts val="600"/>
                 </a:spcAft>
               </a:pPr>
-              <a:t>4</a:t>
+              <a:t>8</a:t>
             </a:fld>
             <a:endParaRPr lang="en-US"/>
           </a:p>
@@ -4662,468 +6163,6 @@
     <p:extLst>
       <p:ext uri="{BB962C8B-B14F-4D97-AF65-F5344CB8AC3E}">
         <p14:creationId xmlns:p14="http://schemas.microsoft.com/office/powerpoint/2010/main" val="1675429794"/>
-      </p:ext>
-    </p:extLst>
-  </p:cSld>
-  <p:clrMapOvr>
-    <a:masterClrMapping/>
-  </p:clrMapOvr>
-</p:sld>
-</file>
-
-<file path=ppt/slides/slide5.xml><?xml version="1.0" encoding="utf-8"?>
-<p:sld xmlns:a="http://schemas.openxmlformats.org/drawingml/2006/main" xmlns:r="http://schemas.openxmlformats.org/officeDocument/2006/relationships" xmlns:p="http://schemas.openxmlformats.org/presentationml/2006/main">
-  <p:cSld>
-    <p:spTree>
-      <p:nvGrpSpPr>
-        <p:cNvPr id="1" name=""/>
-        <p:cNvGrpSpPr/>
-        <p:nvPr/>
-      </p:nvGrpSpPr>
-      <p:grpSpPr>
-        <a:xfrm>
-          <a:off x="0" y="0"/>
-          <a:ext cx="0" cy="0"/>
-          <a:chOff x="0" y="0"/>
-          <a:chExt cx="0" cy="0"/>
-        </a:xfrm>
-      </p:grpSpPr>
-      <p:sp>
-        <p:nvSpPr>
-          <p:cNvPr id="2" name="Title 1">
-            <a:extLst>
-              <a:ext uri="{FF2B5EF4-FFF2-40B4-BE49-F238E27FC236}">
-                <a16:creationId xmlns:a16="http://schemas.microsoft.com/office/drawing/2014/main" id="{43B8A5A9-CAF7-D2CA-DEF4-0F319E37359E}"/>
-              </a:ext>
-            </a:extLst>
-          </p:cNvPr>
-          <p:cNvSpPr>
-            <a:spLocks noGrp="1"/>
-          </p:cNvSpPr>
-          <p:nvPr>
-            <p:ph type="title"/>
-          </p:nvPr>
-        </p:nvSpPr>
-        <p:spPr>
-          <a:xfrm>
-            <a:off x="871108" y="588245"/>
-            <a:ext cx="10449784" cy="1265928"/>
-          </a:xfrm>
-        </p:spPr>
-        <p:txBody>
-          <a:bodyPr anchor="b">
-            <a:normAutofit/>
-          </a:bodyPr>
-          <a:lstStyle/>
-          <a:p>
-            <a:r>
-              <a:rPr lang="en-US" dirty="0"/>
-              <a:t>What is Big-O of the following code snippet?</a:t>
-            </a:r>
-          </a:p>
-        </p:txBody>
-      </p:sp>
-      <p:pic>
-        <p:nvPicPr>
-          <p:cNvPr id="7" name="Picture 6">
-            <a:extLst>
-              <a:ext uri="{FF2B5EF4-FFF2-40B4-BE49-F238E27FC236}">
-                <a16:creationId xmlns:a16="http://schemas.microsoft.com/office/drawing/2014/main" id="{E0C3DDAD-0FFC-1001-5E8D-36F897E67FAB}"/>
-              </a:ext>
-            </a:extLst>
-          </p:cNvPr>
-          <p:cNvPicPr>
-            <a:picLocks noChangeAspect="1"/>
-          </p:cNvPicPr>
-          <p:nvPr/>
-        </p:nvPicPr>
-        <p:blipFill>
-          <a:blip r:embed="rId2"/>
-          <a:stretch>
-            <a:fillRect/>
-          </a:stretch>
-        </p:blipFill>
-        <p:spPr>
-          <a:xfrm>
-            <a:off x="2030401" y="2157984"/>
-            <a:ext cx="8137293" cy="3903819"/>
-          </a:xfrm>
-          <a:prstGeom prst="rect">
-            <a:avLst/>
-          </a:prstGeom>
-          <a:noFill/>
-        </p:spPr>
-      </p:pic>
-      <p:sp>
-        <p:nvSpPr>
-          <p:cNvPr id="4" name="Date Placeholder 3">
-            <a:extLst>
-              <a:ext uri="{FF2B5EF4-FFF2-40B4-BE49-F238E27FC236}">
-                <a16:creationId xmlns:a16="http://schemas.microsoft.com/office/drawing/2014/main" id="{E5E8CB05-5CA8-CC9A-B3F1-B4B9D033F9ED}"/>
-              </a:ext>
-            </a:extLst>
-          </p:cNvPr>
-          <p:cNvSpPr>
-            <a:spLocks noGrp="1"/>
-          </p:cNvSpPr>
-          <p:nvPr>
-            <p:ph type="dt" sz="half" idx="10"/>
-          </p:nvPr>
-        </p:nvSpPr>
-        <p:spPr>
-          <a:xfrm>
-            <a:off x="877824" y="6356350"/>
-            <a:ext cx="2743200" cy="365125"/>
-          </a:xfrm>
-        </p:spPr>
-        <p:txBody>
-          <a:bodyPr anchor="ctr">
-            <a:normAutofit/>
-          </a:bodyPr>
-          <a:lstStyle/>
-          <a:p>
-            <a:pPr>
-              <a:spcAft>
-                <a:spcPts val="600"/>
-              </a:spcAft>
-            </a:pPr>
-            <a:fld id="{579F6069-8263-4296-913A-BC2234E8D32B}" type="datetime1">
-              <a:rPr lang="en-US" smtClean="0"/>
-              <a:pPr>
-                <a:spcAft>
-                  <a:spcPts val="600"/>
-                </a:spcAft>
-              </a:pPr>
-              <a:t>2/8/24</a:t>
-            </a:fld>
-            <a:endParaRPr lang="en-US"/>
-          </a:p>
-        </p:txBody>
-      </p:sp>
-      <p:sp>
-        <p:nvSpPr>
-          <p:cNvPr id="5" name="Footer Placeholder 4">
-            <a:extLst>
-              <a:ext uri="{FF2B5EF4-FFF2-40B4-BE49-F238E27FC236}">
-                <a16:creationId xmlns:a16="http://schemas.microsoft.com/office/drawing/2014/main" id="{D6A45E85-9BAE-6E1D-C857-66956FD17496}"/>
-              </a:ext>
-            </a:extLst>
-          </p:cNvPr>
-          <p:cNvSpPr>
-            <a:spLocks noGrp="1"/>
-          </p:cNvSpPr>
-          <p:nvPr>
-            <p:ph type="ftr" sz="quarter" idx="11"/>
-          </p:nvPr>
-        </p:nvSpPr>
-        <p:spPr>
-          <a:xfrm>
-            <a:off x="7132320" y="6356350"/>
-            <a:ext cx="4297680" cy="365125"/>
-          </a:xfrm>
-        </p:spPr>
-        <p:txBody>
-          <a:bodyPr anchor="ctr">
-            <a:normAutofit/>
-          </a:bodyPr>
-          <a:lstStyle/>
-          <a:p>
-            <a:pPr>
-              <a:spcAft>
-                <a:spcPts val="600"/>
-              </a:spcAft>
-            </a:pPr>
-            <a:r>
-              <a:rPr lang="en-US"/>
-              <a:t>Sample Footer Text</a:t>
-            </a:r>
-          </a:p>
-        </p:txBody>
-      </p:sp>
-      <p:sp>
-        <p:nvSpPr>
-          <p:cNvPr id="6" name="Slide Number Placeholder 5">
-            <a:extLst>
-              <a:ext uri="{FF2B5EF4-FFF2-40B4-BE49-F238E27FC236}">
-                <a16:creationId xmlns:a16="http://schemas.microsoft.com/office/drawing/2014/main" id="{F77F0790-DBD6-D34C-D1A1-6393AA9F8613}"/>
-              </a:ext>
-            </a:extLst>
-          </p:cNvPr>
-          <p:cNvSpPr>
-            <a:spLocks noGrp="1"/>
-          </p:cNvSpPr>
-          <p:nvPr>
-            <p:ph type="sldNum" sz="quarter" idx="12"/>
-          </p:nvPr>
-        </p:nvSpPr>
-        <p:spPr>
-          <a:xfrm>
-            <a:off x="11429999" y="6356350"/>
-            <a:ext cx="521207" cy="365125"/>
-          </a:xfrm>
-        </p:spPr>
-        <p:txBody>
-          <a:bodyPr anchor="ctr">
-            <a:normAutofit/>
-          </a:bodyPr>
-          <a:lstStyle/>
-          <a:p>
-            <a:pPr>
-              <a:spcAft>
-                <a:spcPts val="600"/>
-              </a:spcAft>
-            </a:pPr>
-            <a:fld id="{C68AC1EC-23E2-4F0E-A5A4-674EC8DB954E}" type="slidenum">
-              <a:rPr lang="en-US" smtClean="0"/>
-              <a:pPr>
-                <a:spcAft>
-                  <a:spcPts val="600"/>
-                </a:spcAft>
-              </a:pPr>
-              <a:t>5</a:t>
-            </a:fld>
-            <a:endParaRPr lang="en-US"/>
-          </a:p>
-        </p:txBody>
-      </p:sp>
-    </p:spTree>
-    <p:extLst>
-      <p:ext uri="{BB962C8B-B14F-4D97-AF65-F5344CB8AC3E}">
-        <p14:creationId xmlns:p14="http://schemas.microsoft.com/office/powerpoint/2010/main" val="596331095"/>
-      </p:ext>
-    </p:extLst>
-  </p:cSld>
-  <p:clrMapOvr>
-    <a:masterClrMapping/>
-  </p:clrMapOvr>
-</p:sld>
-</file>
-
-<file path=ppt/slides/slide6.xml><?xml version="1.0" encoding="utf-8"?>
-<p:sld xmlns:a="http://schemas.openxmlformats.org/drawingml/2006/main" xmlns:r="http://schemas.openxmlformats.org/officeDocument/2006/relationships" xmlns:p="http://schemas.openxmlformats.org/presentationml/2006/main">
-  <p:cSld>
-    <p:spTree>
-      <p:nvGrpSpPr>
-        <p:cNvPr id="1" name="">
-          <a:extLst>
-            <a:ext uri="{FF2B5EF4-FFF2-40B4-BE49-F238E27FC236}">
-              <a16:creationId xmlns:a16="http://schemas.microsoft.com/office/drawing/2014/main" id="{388E5643-27E7-4DE4-67A1-927383C0F6BE}"/>
-            </a:ext>
-          </a:extLst>
-        </p:cNvPr>
-        <p:cNvGrpSpPr/>
-        <p:nvPr/>
-      </p:nvGrpSpPr>
-      <p:grpSpPr>
-        <a:xfrm>
-          <a:off x="0" y="0"/>
-          <a:ext cx="0" cy="0"/>
-          <a:chOff x="0" y="0"/>
-          <a:chExt cx="0" cy="0"/>
-        </a:xfrm>
-      </p:grpSpPr>
-      <p:sp>
-        <p:nvSpPr>
-          <p:cNvPr id="2" name="Title 1">
-            <a:extLst>
-              <a:ext uri="{FF2B5EF4-FFF2-40B4-BE49-F238E27FC236}">
-                <a16:creationId xmlns:a16="http://schemas.microsoft.com/office/drawing/2014/main" id="{58855680-EFDD-8316-E960-85233D5940CA}"/>
-              </a:ext>
-            </a:extLst>
-          </p:cNvPr>
-          <p:cNvSpPr>
-            <a:spLocks noGrp="1"/>
-          </p:cNvSpPr>
-          <p:nvPr>
-            <p:ph type="title"/>
-          </p:nvPr>
-        </p:nvSpPr>
-        <p:spPr>
-          <a:xfrm>
-            <a:off x="871108" y="588245"/>
-            <a:ext cx="10449784" cy="1265928"/>
-          </a:xfrm>
-        </p:spPr>
-        <p:txBody>
-          <a:bodyPr anchor="b">
-            <a:normAutofit/>
-          </a:bodyPr>
-          <a:lstStyle/>
-          <a:p>
-            <a:r>
-              <a:rPr lang="en-US" dirty="0"/>
-              <a:t>What is Big-O of the following code snippet?</a:t>
-            </a:r>
-          </a:p>
-        </p:txBody>
-      </p:sp>
-      <p:pic>
-        <p:nvPicPr>
-          <p:cNvPr id="7" name="Picture 6">
-            <a:extLst>
-              <a:ext uri="{FF2B5EF4-FFF2-40B4-BE49-F238E27FC236}">
-                <a16:creationId xmlns:a16="http://schemas.microsoft.com/office/drawing/2014/main" id="{14C42B1D-E13F-3E01-2164-BDC1E1F6840A}"/>
-              </a:ext>
-            </a:extLst>
-          </p:cNvPr>
-          <p:cNvPicPr>
-            <a:picLocks noChangeAspect="1"/>
-          </p:cNvPicPr>
-          <p:nvPr/>
-        </p:nvPicPr>
-        <p:blipFill>
-          <a:blip r:embed="rId2"/>
-          <a:stretch>
-            <a:fillRect/>
-          </a:stretch>
-        </p:blipFill>
-        <p:spPr>
-          <a:xfrm>
-            <a:off x="3006975" y="2157984"/>
-            <a:ext cx="6184145" cy="3903819"/>
-          </a:xfrm>
-          <a:prstGeom prst="rect">
-            <a:avLst/>
-          </a:prstGeom>
-          <a:noFill/>
-        </p:spPr>
-      </p:pic>
-      <p:sp>
-        <p:nvSpPr>
-          <p:cNvPr id="4" name="Date Placeholder 3">
-            <a:extLst>
-              <a:ext uri="{FF2B5EF4-FFF2-40B4-BE49-F238E27FC236}">
-                <a16:creationId xmlns:a16="http://schemas.microsoft.com/office/drawing/2014/main" id="{59C39B99-D30E-C0C4-21B1-C292F24E3CFB}"/>
-              </a:ext>
-            </a:extLst>
-          </p:cNvPr>
-          <p:cNvSpPr>
-            <a:spLocks noGrp="1"/>
-          </p:cNvSpPr>
-          <p:nvPr>
-            <p:ph type="dt" sz="half" idx="10"/>
-          </p:nvPr>
-        </p:nvSpPr>
-        <p:spPr>
-          <a:xfrm>
-            <a:off x="877824" y="6356350"/>
-            <a:ext cx="2743200" cy="365125"/>
-          </a:xfrm>
-        </p:spPr>
-        <p:txBody>
-          <a:bodyPr anchor="ctr">
-            <a:normAutofit/>
-          </a:bodyPr>
-          <a:lstStyle/>
-          <a:p>
-            <a:pPr>
-              <a:spcAft>
-                <a:spcPts val="600"/>
-              </a:spcAft>
-            </a:pPr>
-            <a:fld id="{579F6069-8263-4296-913A-BC2234E8D32B}" type="datetime1">
-              <a:rPr lang="en-US" smtClean="0"/>
-              <a:pPr>
-                <a:spcAft>
-                  <a:spcPts val="600"/>
-                </a:spcAft>
-              </a:pPr>
-              <a:t>2/8/24</a:t>
-            </a:fld>
-            <a:endParaRPr lang="en-US"/>
-          </a:p>
-        </p:txBody>
-      </p:sp>
-      <p:sp>
-        <p:nvSpPr>
-          <p:cNvPr id="5" name="Footer Placeholder 4">
-            <a:extLst>
-              <a:ext uri="{FF2B5EF4-FFF2-40B4-BE49-F238E27FC236}">
-                <a16:creationId xmlns:a16="http://schemas.microsoft.com/office/drawing/2014/main" id="{832D260E-F93F-92BA-F214-3F15CF250402}"/>
-              </a:ext>
-            </a:extLst>
-          </p:cNvPr>
-          <p:cNvSpPr>
-            <a:spLocks noGrp="1"/>
-          </p:cNvSpPr>
-          <p:nvPr>
-            <p:ph type="ftr" sz="quarter" idx="11"/>
-          </p:nvPr>
-        </p:nvSpPr>
-        <p:spPr>
-          <a:xfrm>
-            <a:off x="7132320" y="6356350"/>
-            <a:ext cx="4297680" cy="365125"/>
-          </a:xfrm>
-        </p:spPr>
-        <p:txBody>
-          <a:bodyPr anchor="ctr">
-            <a:normAutofit/>
-          </a:bodyPr>
-          <a:lstStyle/>
-          <a:p>
-            <a:pPr>
-              <a:spcAft>
-                <a:spcPts val="600"/>
-              </a:spcAft>
-            </a:pPr>
-            <a:r>
-              <a:rPr lang="en-US"/>
-              <a:t>Sample Footer Text</a:t>
-            </a:r>
-          </a:p>
-        </p:txBody>
-      </p:sp>
-      <p:sp>
-        <p:nvSpPr>
-          <p:cNvPr id="6" name="Slide Number Placeholder 5">
-            <a:extLst>
-              <a:ext uri="{FF2B5EF4-FFF2-40B4-BE49-F238E27FC236}">
-                <a16:creationId xmlns:a16="http://schemas.microsoft.com/office/drawing/2014/main" id="{7FDBE023-49DC-9421-9B8B-C8A4A907CC5A}"/>
-              </a:ext>
-            </a:extLst>
-          </p:cNvPr>
-          <p:cNvSpPr>
-            <a:spLocks noGrp="1"/>
-          </p:cNvSpPr>
-          <p:nvPr>
-            <p:ph type="sldNum" sz="quarter" idx="12"/>
-          </p:nvPr>
-        </p:nvSpPr>
-        <p:spPr>
-          <a:xfrm>
-            <a:off x="11429999" y="6356350"/>
-            <a:ext cx="521207" cy="365125"/>
-          </a:xfrm>
-        </p:spPr>
-        <p:txBody>
-          <a:bodyPr anchor="ctr">
-            <a:normAutofit/>
-          </a:bodyPr>
-          <a:lstStyle/>
-          <a:p>
-            <a:pPr>
-              <a:spcAft>
-                <a:spcPts val="600"/>
-              </a:spcAft>
-            </a:pPr>
-            <a:fld id="{C68AC1EC-23E2-4F0E-A5A4-674EC8DB954E}" type="slidenum">
-              <a:rPr lang="en-US" smtClean="0"/>
-              <a:pPr>
-                <a:spcAft>
-                  <a:spcPts val="600"/>
-                </a:spcAft>
-              </a:pPr>
-              <a:t>6</a:t>
-            </a:fld>
-            <a:endParaRPr lang="en-US"/>
-          </a:p>
-        </p:txBody>
-      </p:sp>
-    </p:spTree>
-    <p:extLst>
-      <p:ext uri="{BB962C8B-B14F-4D97-AF65-F5344CB8AC3E}">
-        <p14:creationId xmlns:p14="http://schemas.microsoft.com/office/powerpoint/2010/main" val="2654580552"/>
       </p:ext>
     </p:extLst>
   </p:cSld>

</xml_diff>